<commit_message>
poster teil input fertig
</commit_message>
<xml_diff>
--- a/poster/poster.pptx
+++ b/poster/poster.pptx
@@ -117,6 +117,72 @@
       </a:defRPr>
     </a:lvl9pPr>
   </p:defaultTextStyle>
+  <p:extLst>
+    <p:ext uri="{EFAFB233-063F-42B5-8137-9DF3F51BA10A}">
+      <p15:sldGuideLst xmlns:p15="http://schemas.microsoft.com/office/powerpoint/2012/main">
+        <p15:guide id="1" orient="horz" pos="771">
+          <p15:clr>
+            <a:srgbClr val="A4A3A4"/>
+          </p15:clr>
+        </p15:guide>
+        <p15:guide id="2" orient="horz" pos="2767">
+          <p15:clr>
+            <a:srgbClr val="A4A3A4"/>
+          </p15:clr>
+        </p15:guide>
+        <p15:guide id="3" orient="horz" pos="8891">
+          <p15:clr>
+            <a:srgbClr val="A4A3A4"/>
+          </p15:clr>
+        </p15:guide>
+        <p15:guide id="4" orient="horz" pos="2881">
+          <p15:clr>
+            <a:srgbClr val="A4A3A4"/>
+          </p15:clr>
+        </p15:guide>
+        <p15:guide id="5" pos="3255">
+          <p15:clr>
+            <a:srgbClr val="A4A3A4"/>
+          </p15:clr>
+        </p15:guide>
+        <p15:guide id="6" pos="6452">
+          <p15:clr>
+            <a:srgbClr val="A4A3A4"/>
+          </p15:clr>
+        </p15:guide>
+        <p15:guide id="7" pos="3481">
+          <p15:clr>
+            <a:srgbClr val="A4A3A4"/>
+          </p15:clr>
+        </p15:guide>
+        <p15:guide id="8" pos="284">
+          <p15:clr>
+            <a:srgbClr val="A4A3A4"/>
+          </p15:clr>
+        </p15:guide>
+        <p15:guide id="9" pos="2189">
+          <p15:clr>
+            <a:srgbClr val="A4A3A4"/>
+          </p15:clr>
+        </p15:guide>
+        <p15:guide id="10" pos="2415">
+          <p15:clr>
+            <a:srgbClr val="A4A3A4"/>
+          </p15:clr>
+        </p15:guide>
+        <p15:guide id="11" pos="4321">
+          <p15:clr>
+            <a:srgbClr val="A4A3A4"/>
+          </p15:clr>
+        </p15:guide>
+        <p15:guide id="12" pos="4547">
+          <p15:clr>
+            <a:srgbClr val="A4A3A4"/>
+          </p15:clr>
+        </p15:guide>
+      </p15:sldGuideLst>
+    </p:ext>
+  </p:extLst>
 </p:presentation>
 </file>
 
@@ -503,7 +569,7 @@
   <p:timing>
     <p:tnLst>
       <p:par>
-        <p:cTn xmlns:p14="http://schemas.microsoft.com/office/powerpoint/2010/main" id="1" dur="indefinite" restart="never" nodeType="tmRoot"/>
+        <p:cTn id="1" dur="indefinite" restart="never" nodeType="tmRoot"/>
       </p:par>
     </p:tnLst>
   </p:timing>
@@ -2523,7 +2589,7 @@
   <p:timing>
     <p:tnLst>
       <p:par>
-        <p:cTn xmlns:p14="http://schemas.microsoft.com/office/powerpoint/2010/main" id="1" dur="indefinite" restart="never" nodeType="tmRoot"/>
+        <p:cTn id="1" dur="indefinite" restart="never" nodeType="tmRoot"/>
       </p:par>
     </p:tnLst>
   </p:timing>
@@ -3201,7 +3267,7 @@
   <p:timing>
     <p:tnLst>
       <p:par>
-        <p:cTn xmlns:p14="http://schemas.microsoft.com/office/powerpoint/2010/main" id="1" dur="indefinite" restart="never" nodeType="tmRoot"/>
+        <p:cTn id="1" dur="indefinite" restart="never" nodeType="tmRoot"/>
       </p:par>
     </p:tnLst>
   </p:timing>
@@ -3879,7 +3945,7 @@
   <p:timing>
     <p:tnLst>
       <p:par>
-        <p:cTn xmlns:p14="http://schemas.microsoft.com/office/powerpoint/2010/main" id="1" dur="indefinite" restart="never" nodeType="tmRoot"/>
+        <p:cTn id="1" dur="indefinite" restart="never" nodeType="tmRoot"/>
       </p:par>
     </p:tnLst>
   </p:timing>
@@ -4595,7 +4661,7 @@
   <p:timing>
     <p:tnLst>
       <p:par>
-        <p:cTn xmlns:p14="http://schemas.microsoft.com/office/powerpoint/2010/main" id="1" dur="indefinite" restart="never" nodeType="tmRoot"/>
+        <p:cTn id="1" dur="indefinite" restart="never" nodeType="tmRoot"/>
       </p:par>
     </p:tnLst>
   </p:timing>
@@ -7957,7 +8023,7 @@
   <p:timing>
     <p:tnLst>
       <p:par>
-        <p:cTn xmlns:p14="http://schemas.microsoft.com/office/powerpoint/2010/main" id="1" dur="indefinite" restart="never" nodeType="tmRoot"/>
+        <p:cTn id="1" dur="indefinite" restart="never" nodeType="tmRoot"/>
       </p:par>
     </p:tnLst>
   </p:timing>
@@ -11820,7 +11886,7 @@
   <p:timing>
     <p:tnLst>
       <p:par>
-        <p:cTn xmlns:p14="http://schemas.microsoft.com/office/powerpoint/2010/main" id="1" dur="indefinite" restart="never" nodeType="tmRoot"/>
+        <p:cTn id="1" dur="indefinite" restart="never" nodeType="tmRoot"/>
       </p:par>
     </p:tnLst>
   </p:timing>
@@ -14610,7 +14676,7 @@
   <p:timing>
     <p:tnLst>
       <p:par>
-        <p:cTn xmlns:p14="http://schemas.microsoft.com/office/powerpoint/2010/main" id="1" dur="indefinite" restart="never" nodeType="tmRoot"/>
+        <p:cTn id="1" dur="indefinite" restart="never" nodeType="tmRoot"/>
       </p:par>
     </p:tnLst>
   </p:timing>
@@ -17400,7 +17466,7 @@
   <p:timing>
     <p:tnLst>
       <p:par>
-        <p:cTn xmlns:p14="http://schemas.microsoft.com/office/powerpoint/2010/main" id="1" dur="indefinite" restart="never" nodeType="tmRoot"/>
+        <p:cTn id="1" dur="indefinite" restart="never" nodeType="tmRoot"/>
       </p:par>
     </p:tnLst>
   </p:timing>
@@ -20190,7 +20256,7 @@
   <p:timing>
     <p:tnLst>
       <p:par>
-        <p:cTn xmlns:p14="http://schemas.microsoft.com/office/powerpoint/2010/main" id="1" dur="indefinite" restart="never" nodeType="tmRoot"/>
+        <p:cTn id="1" dur="indefinite" restart="never" nodeType="tmRoot"/>
       </p:par>
     </p:tnLst>
   </p:timing>
@@ -22980,7 +23046,7 @@
   <p:timing>
     <p:tnLst>
       <p:par>
-        <p:cTn xmlns:p14="http://schemas.microsoft.com/office/powerpoint/2010/main" id="1" dur="indefinite" restart="never" nodeType="tmRoot"/>
+        <p:cTn id="1" dur="indefinite" restart="never" nodeType="tmRoot"/>
       </p:par>
     </p:tnLst>
   </p:timing>
@@ -25770,7 +25836,7 @@
   <p:timing>
     <p:tnLst>
       <p:par>
-        <p:cTn xmlns:p14="http://schemas.microsoft.com/office/powerpoint/2010/main" id="1" dur="indefinite" restart="never" nodeType="tmRoot"/>
+        <p:cTn id="1" dur="indefinite" restart="never" nodeType="tmRoot"/>
       </p:par>
     </p:tnLst>
   </p:timing>
@@ -28560,7 +28626,7 @@
   <p:timing>
     <p:tnLst>
       <p:par>
-        <p:cTn xmlns:p14="http://schemas.microsoft.com/office/powerpoint/2010/main" id="1" dur="indefinite" restart="never" nodeType="tmRoot"/>
+        <p:cTn id="1" dur="indefinite" restart="never" nodeType="tmRoot"/>
       </p:par>
     </p:tnLst>
   </p:timing>
@@ -31350,7 +31416,7 @@
   <p:timing>
     <p:tnLst>
       <p:par>
-        <p:cTn xmlns:p14="http://schemas.microsoft.com/office/powerpoint/2010/main" id="1" dur="indefinite" restart="never" nodeType="tmRoot"/>
+        <p:cTn id="1" dur="indefinite" restart="never" nodeType="tmRoot"/>
       </p:par>
     </p:tnLst>
   </p:timing>
@@ -34140,7 +34206,7 @@
   <p:timing>
     <p:tnLst>
       <p:par>
-        <p:cTn xmlns:p14="http://schemas.microsoft.com/office/powerpoint/2010/main" id="1" dur="indefinite" restart="never" nodeType="tmRoot"/>
+        <p:cTn id="1" dur="indefinite" restart="never" nodeType="tmRoot"/>
       </p:par>
     </p:tnLst>
   </p:timing>
@@ -36930,7 +36996,7 @@
   <p:timing>
     <p:tnLst>
       <p:par>
-        <p:cTn xmlns:p14="http://schemas.microsoft.com/office/powerpoint/2010/main" id="1" dur="indefinite" restart="never" nodeType="tmRoot"/>
+        <p:cTn id="1" dur="indefinite" restart="never" nodeType="tmRoot"/>
       </p:par>
     </p:tnLst>
   </p:timing>
@@ -39720,7 +39786,7 @@
   <p:timing>
     <p:tnLst>
       <p:par>
-        <p:cTn xmlns:p14="http://schemas.microsoft.com/office/powerpoint/2010/main" id="1" dur="indefinite" restart="never" nodeType="tmRoot"/>
+        <p:cTn id="1" dur="indefinite" restart="never" nodeType="tmRoot"/>
       </p:par>
     </p:tnLst>
   </p:timing>
@@ -42510,7 +42576,7 @@
   <p:timing>
     <p:tnLst>
       <p:par>
-        <p:cTn xmlns:p14="http://schemas.microsoft.com/office/powerpoint/2010/main" id="1" dur="indefinite" restart="never" nodeType="tmRoot"/>
+        <p:cTn id="1" dur="indefinite" restart="never" nodeType="tmRoot"/>
       </p:par>
     </p:tnLst>
   </p:timing>
@@ -45300,7 +45366,7 @@
   <p:timing>
     <p:tnLst>
       <p:par>
-        <p:cTn xmlns:p14="http://schemas.microsoft.com/office/powerpoint/2010/main" id="1" dur="indefinite" restart="never" nodeType="tmRoot"/>
+        <p:cTn id="1" dur="indefinite" restart="never" nodeType="tmRoot"/>
       </p:par>
     </p:tnLst>
   </p:timing>
@@ -48090,7 +48156,7 @@
   <p:timing>
     <p:tnLst>
       <p:par>
-        <p:cTn xmlns:p14="http://schemas.microsoft.com/office/powerpoint/2010/main" id="1" dur="indefinite" restart="never" nodeType="tmRoot"/>
+        <p:cTn id="1" dur="indefinite" restart="never" nodeType="tmRoot"/>
       </p:par>
     </p:tnLst>
   </p:timing>
@@ -48562,12 +48628,12 @@
           </a:lstStyle>
           <a:p>
             <a:r>
-              <a:rPr lang="en-GB" b="1" dirty="0" smtClean="0"/>
+              <a:rPr lang="en-GB" sz="1200" b="1" dirty="0" smtClean="0"/>
               <a:t>Input Data / Preparation</a:t>
             </a:r>
           </a:p>
           <a:p>
-            <a:endParaRPr lang="en-GB" dirty="0" smtClean="0"/>
+            <a:endParaRPr lang="en-GB" sz="1100" dirty="0" smtClean="0"/>
           </a:p>
           <a:p>
             <a:pPr marL="171450" indent="-171450">
@@ -48575,23 +48641,34 @@
               <a:buChar char="•"/>
             </a:pPr>
             <a:r>
-              <a:rPr lang="en-GB" dirty="0" smtClean="0"/>
-              <a:t>Data: ModelNet10/40 - CAD Models of </a:t>
+              <a:rPr lang="en-GB" sz="1100" dirty="0"/>
+              <a:t>ModelNet10/40 </a:t>
+            </a:r>
+            <a:r>
+              <a:rPr lang="en-GB" sz="1100" dirty="0" smtClean="0"/>
+              <a:t>dataset </a:t>
+            </a:r>
+            <a:r>
+              <a:rPr lang="en-GB" sz="1100" dirty="0" smtClean="0"/>
+              <a:t>- 3D CAD models </a:t>
+            </a:r>
+            <a:br>
+              <a:rPr lang="en-GB" sz="1100" dirty="0" smtClean="0"/>
+            </a:br>
+            <a:r>
+              <a:rPr lang="en-GB" sz="1100" dirty="0" smtClean="0"/>
+              <a:t>of 10/40 common object categories with </a:t>
+            </a:r>
+            <a:br>
+              <a:rPr lang="en-GB" sz="1100" dirty="0" smtClean="0"/>
+            </a:br>
+            <a:r>
+              <a:rPr lang="en-GB" sz="1100" dirty="0" smtClean="0"/>
+              <a:t>100 unique models each (.mat files)</a:t>
             </a:r>
           </a:p>
           <a:p>
-            <a:r>
-              <a:rPr lang="en-GB" dirty="0" smtClean="0"/>
-              <a:t>     10/40 Object categories (.mat files)</a:t>
-            </a:r>
-          </a:p>
-          <a:p>
-            <a:pPr>
-              <a:lnSpc>
-                <a:spcPct val="50000"/>
-              </a:lnSpc>
-            </a:pPr>
-            <a:endParaRPr lang="en-GB" dirty="0" smtClean="0"/>
+            <a:endParaRPr lang="en-GB" sz="1100" dirty="0" smtClean="0"/>
           </a:p>
           <a:p>
             <a:pPr marL="171450" indent="-171450">
@@ -48599,31 +48676,58 @@
               <a:buChar char="•"/>
             </a:pPr>
             <a:r>
-              <a:rPr lang="en-GB" dirty="0" smtClean="0"/>
-              <a:t>Given: For every object, a 30 x 30 Voxel Grid and 2.5D view point data every 30°</a:t>
-            </a:r>
-          </a:p>
-          <a:p>
-            <a:pPr>
-              <a:lnSpc>
-                <a:spcPct val="50000"/>
-              </a:lnSpc>
-            </a:pPr>
-            <a:endParaRPr lang="en-GB" dirty="0" smtClean="0"/>
+              <a:rPr lang="en-GB" sz="1100" dirty="0" smtClean="0"/>
+              <a:t>A 3D shape is represented as 32 x 32 x 32 voxel grid (Fig. 2). </a:t>
+            </a:r>
           </a:p>
           <a:p>
             <a:pPr marL="171450" indent="-171450">
               <a:buFont typeface="Arial"/>
               <a:buChar char="•"/>
             </a:pPr>
-            <a:r>
-              <a:rPr lang="en-GB" i="1" dirty="0" smtClean="0"/>
-              <a:t>Contributed</a:t>
-            </a:r>
-            <a:r>
-              <a:rPr lang="en-GB" dirty="0" smtClean="0"/>
-              <a:t>: Created train &amp; test set from given .mat files – save as highly compressed hdf5 binary data format</a:t>
-            </a:r>
+            <a:endParaRPr lang="en-GB" sz="1100" dirty="0" smtClean="0"/>
+          </a:p>
+          <a:p>
+            <a:pPr marL="171450" indent="-171450">
+              <a:buFont typeface="Arial"/>
+              <a:buChar char="•"/>
+            </a:pPr>
+            <a:r>
+              <a:rPr lang="en-GB" sz="1100" i="1" dirty="0" smtClean="0"/>
+              <a:t>Contribution</a:t>
+            </a:r>
+            <a:r>
+              <a:rPr lang="en-GB" sz="1100" dirty="0" smtClean="0"/>
+              <a:t>: Converted multiple .</a:t>
+            </a:r>
+            <a:r>
+              <a:rPr lang="en-GB" sz="1100" dirty="0" smtClean="0"/>
+              <a:t>mat </a:t>
+            </a:r>
+            <a:r>
+              <a:rPr lang="en-GB" sz="1100" dirty="0"/>
+              <a:t>files </a:t>
+            </a:r>
+            <a:r>
+              <a:rPr lang="en-GB" sz="1100" dirty="0" smtClean="0"/>
+              <a:t>to a single </a:t>
+            </a:r>
+            <a:r>
+              <a:rPr lang="en-GB" sz="1100" dirty="0"/>
+              <a:t>highly compressed hdf5 </a:t>
+            </a:r>
+            <a:r>
+              <a:rPr lang="en-GB" sz="1100" dirty="0" smtClean="0"/>
+              <a:t>file for </a:t>
+            </a:r>
+            <a:r>
+              <a:rPr lang="en-GB" sz="1100" smtClean="0"/>
+              <a:t>easy usage</a:t>
+            </a:r>
+            <a:endParaRPr lang="en-GB" sz="1100" dirty="0" smtClean="0"/>
+          </a:p>
+          <a:p>
+            <a:endParaRPr lang="en-GB" dirty="0" smtClean="0"/>
           </a:p>
           <a:p>
             <a:endParaRPr lang="en-GB" dirty="0"/>
@@ -48631,11 +48735,7 @@
           <a:p>
             <a:r>
               <a:rPr lang="en-GB" b="1" dirty="0" smtClean="0"/>
-              <a:t>Deep Convolutional </a:t>
-            </a:r>
-            <a:r>
-              <a:rPr lang="en-GB" b="1" dirty="0" smtClean="0"/>
-              <a:t>Neural Networks </a:t>
+              <a:t>Deep Convolutional Neural Networks </a:t>
             </a:r>
           </a:p>
           <a:p>
@@ -48651,7 +48751,6 @@
               <a:rPr lang="en-GB" dirty="0" smtClean="0"/>
               <a:t>General: </a:t>
             </a:r>
-            <a:endParaRPr lang="en-GB" dirty="0" smtClean="0"/>
           </a:p>
           <a:p>
             <a:pPr>
@@ -48683,19 +48782,7 @@
             </a:r>
             <a:r>
               <a:rPr lang="en-GB" dirty="0" smtClean="0"/>
-              <a:t>   </a:t>
-            </a:r>
-            <a:r>
-              <a:rPr lang="en-GB" dirty="0" smtClean="0"/>
-              <a:t>  </a:t>
-            </a:r>
-            <a:r>
-              <a:rPr lang="en-GB" dirty="0" smtClean="0"/>
-              <a:t>as a Classification </a:t>
-            </a:r>
-            <a:r>
-              <a:rPr lang="en-GB" dirty="0" smtClean="0"/>
-              <a:t>Problem</a:t>
+              <a:t>     as a Classification Problem</a:t>
             </a:r>
           </a:p>
           <a:p>
@@ -48872,7 +48959,6 @@
               <a:rPr lang="en-GB" dirty="0" smtClean="0"/>
               <a:t>    </a:t>
             </a:r>
-            <a:endParaRPr lang="en-GB" dirty="0" smtClean="0"/>
           </a:p>
           <a:p>
             <a:pPr>
@@ -48927,19 +49013,7 @@
             </a:r>
             <a:r>
               <a:rPr lang="en-GB" dirty="0" smtClean="0"/>
-              <a:t>    </a:t>
-            </a:r>
-            <a:r>
-              <a:rPr lang="en-GB" dirty="0" smtClean="0"/>
-              <a:t>CNN </a:t>
-            </a:r>
-            <a:r>
-              <a:rPr lang="en-GB" dirty="0" smtClean="0"/>
-              <a:t>of ~ 900t </a:t>
-            </a:r>
-            <a:r>
-              <a:rPr lang="en-GB" dirty="0" smtClean="0"/>
-              <a:t>parameters</a:t>
+              <a:t>    CNN of ~ 900t parameters</a:t>
             </a:r>
           </a:p>
           <a:p>
@@ -52047,28 +52121,46 @@
           <a:p>
             <a:r>
               <a:rPr lang="de-CH" dirty="0"/>
-              <a:t>2	</a:t>
-            </a:r>
-            <a:r>
-              <a:rPr lang="de-CH" dirty="0" err="1"/>
-              <a:t>Method</a:t>
-            </a:r>
-            <a:r>
-              <a:rPr lang="de-CH" dirty="0"/>
-              <a:t> </a:t>
-            </a:r>
-            <a:r>
-              <a:rPr lang="de-CH" dirty="0" err="1"/>
-              <a:t>o</a:t>
-            </a:r>
-            <a:r>
-              <a:rPr lang="de-CH" dirty="0" err="1" smtClean="0"/>
-              <a:t>verview</a:t>
+              <a:t>2	Method </a:t>
+            </a:r>
+            <a:r>
+              <a:rPr lang="de-CH" dirty="0" smtClean="0"/>
+              <a:t>Overview</a:t>
             </a:r>
             <a:endParaRPr lang="de-CH" dirty="0"/>
           </a:p>
         </p:txBody>
       </p:sp>
+      <p:pic>
+        <p:nvPicPr>
+          <p:cNvPr id="8" name="Bild 7" descr="Screen Shot 2016-05-20 at 11.11.10.png"/>
+          <p:cNvPicPr>
+            <a:picLocks noChangeAspect="1"/>
+          </p:cNvPicPr>
+          <p:nvPr/>
+        </p:nvPicPr>
+        <p:blipFill>
+          <a:blip r:embed="rId2" cstate="print">
+            <a:extLst>
+              <a:ext uri="{28A0092B-C50C-407E-A947-70E740481C1C}">
+                <a14:useLocalDpi xmlns:a14="http://schemas.microsoft.com/office/drawing/2010/main" val="0"/>
+              </a:ext>
+            </a:extLst>
+          </a:blip>
+          <a:stretch>
+            <a:fillRect/>
+          </a:stretch>
+        </p:blipFill>
+        <p:spPr>
+          <a:xfrm>
+            <a:off x="3516546" y="5040982"/>
+            <a:ext cx="1631064" cy="823749"/>
+          </a:xfrm>
+          <a:prstGeom prst="rect">
+            <a:avLst/>
+          </a:prstGeom>
+        </p:spPr>
+      </p:pic>
       <p:pic>
         <p:nvPicPr>
           <p:cNvPr id="31" name="Screen Shot 2016-03-11 at 16.17.53.png"/>
@@ -52078,7 +52170,7 @@
           <p:nvPr/>
         </p:nvPicPr>
         <p:blipFill>
-          <a:blip r:embed="rId2">
+          <a:blip r:embed="rId3">
             <a:extLst/>
           </a:blip>
           <a:stretch>
@@ -52389,36 +52481,6 @@
       </p:sp>
       <p:pic>
         <p:nvPicPr>
-          <p:cNvPr id="8" name="Bild 7" descr="Screen Shot 2016-05-20 at 11.11.10.png"/>
-          <p:cNvPicPr>
-            <a:picLocks noChangeAspect="1"/>
-          </p:cNvPicPr>
-          <p:nvPr/>
-        </p:nvPicPr>
-        <p:blipFill>
-          <a:blip r:embed="rId3">
-            <a:extLst>
-              <a:ext uri="{28A0092B-C50C-407E-A947-70E740481C1C}">
-                <a14:useLocalDpi xmlns:a14="http://schemas.microsoft.com/office/drawing/2010/main" val="0"/>
-              </a:ext>
-            </a:extLst>
-          </a:blip>
-          <a:stretch>
-            <a:fillRect/>
-          </a:stretch>
-        </p:blipFill>
-        <p:spPr>
-          <a:xfrm>
-            <a:off x="3383719" y="4860962"/>
-            <a:ext cx="1710953" cy="864096"/>
-          </a:xfrm>
-          <a:prstGeom prst="rect">
-            <a:avLst/>
-          </a:prstGeom>
-        </p:spPr>
-      </p:pic>
-      <p:pic>
-        <p:nvPicPr>
           <p:cNvPr id="42" name="Inhaltsplatzhalter 1"/>
           <p:cNvPicPr>
             <a:picLocks noChangeAspect="1"/>
@@ -52426,7 +52488,7 @@
           <p:nvPr/>
         </p:nvPicPr>
         <p:blipFill>
-          <a:blip r:embed="rId4">
+          <a:blip r:embed="rId4" cstate="print">
             <a:extLst>
               <a:ext uri="{28A0092B-C50C-407E-A947-70E740481C1C}">
                 <a14:useLocalDpi xmlns:a14="http://schemas.microsoft.com/office/drawing/2010/main" val="0"/>
@@ -52456,7 +52518,7 @@
           <p:nvPr/>
         </p:nvPicPr>
         <p:blipFill>
-          <a:blip r:embed="rId5">
+          <a:blip r:embed="rId5" cstate="print">
             <a:extLst>
               <a:ext uri="{28A0092B-C50C-407E-A947-70E740481C1C}">
                 <a14:useLocalDpi xmlns:a14="http://schemas.microsoft.com/office/drawing/2010/main" val="0"/>
@@ -52502,9 +52564,27 @@
                 <a:tableStyleId>{00A15C55-8517-42AA-B614-E9B94910E393}</a:tableStyleId>
               </a:tblPr>
               <a:tblGrid>
-                <a:gridCol w="1080120"/>
-                <a:gridCol w="1080120"/>
-                <a:gridCol w="1080120"/>
+                <a:gridCol w="1080120">
+                  <a:extLst>
+                    <a:ext uri="{9D8B030D-6E8A-4147-A177-3AD203B41FA5}">
+                      <a16:colId xmlns:a16="http://schemas.microsoft.com/office/drawing/2014/main" val="20000"/>
+                    </a:ext>
+                  </a:extLst>
+                </a:gridCol>
+                <a:gridCol w="1080120">
+                  <a:extLst>
+                    <a:ext uri="{9D8B030D-6E8A-4147-A177-3AD203B41FA5}">
+                      <a16:colId xmlns:a16="http://schemas.microsoft.com/office/drawing/2014/main" val="20001"/>
+                    </a:ext>
+                  </a:extLst>
+                </a:gridCol>
+                <a:gridCol w="1080120">
+                  <a:extLst>
+                    <a:ext uri="{9D8B030D-6E8A-4147-A177-3AD203B41FA5}">
+                      <a16:colId xmlns:a16="http://schemas.microsoft.com/office/drawing/2014/main" val="20002"/>
+                    </a:ext>
+                  </a:extLst>
+                </a:gridCol>
               </a:tblGrid>
               <a:tr h="530159">
                 <a:tc>
@@ -52682,6 +52762,11 @@
                     </a:lnBlToTr>
                   </a:tcPr>
                 </a:tc>
+                <a:extLst>
+                  <a:ext uri="{0D108BD9-81ED-4DB2-BD59-A6C34878D82A}">
+                    <a16:rowId xmlns:a16="http://schemas.microsoft.com/office/drawing/2014/main" val="10000"/>
+                  </a:ext>
+                </a:extLst>
               </a:tr>
               <a:tr h="195322">
                 <a:tc>
@@ -52838,6 +52923,11 @@
                     </a:lnBlToTr>
                   </a:tcPr>
                 </a:tc>
+                <a:extLst>
+                  <a:ext uri="{0D108BD9-81ED-4DB2-BD59-A6C34878D82A}">
+                    <a16:rowId xmlns:a16="http://schemas.microsoft.com/office/drawing/2014/main" val="10001"/>
+                  </a:ext>
+                </a:extLst>
               </a:tr>
               <a:tr h="195322">
                 <a:tc>
@@ -52986,6 +53076,11 @@
                     </a:lnBlToTr>
                   </a:tcPr>
                 </a:tc>
+                <a:extLst>
+                  <a:ext uri="{0D108BD9-81ED-4DB2-BD59-A6C34878D82A}">
+                    <a16:rowId xmlns:a16="http://schemas.microsoft.com/office/drawing/2014/main" val="10002"/>
+                  </a:ext>
+                </a:extLst>
               </a:tr>
               <a:tr h="195322">
                 <a:tc>
@@ -53162,6 +53257,11 @@
                     </a:lnBlToTr>
                   </a:tcPr>
                 </a:tc>
+                <a:extLst>
+                  <a:ext uri="{0D108BD9-81ED-4DB2-BD59-A6C34878D82A}">
+                    <a16:rowId xmlns:a16="http://schemas.microsoft.com/office/drawing/2014/main" val="10003"/>
+                  </a:ext>
+                </a:extLst>
               </a:tr>
             </a:tbl>
           </a:graphicData>
@@ -53176,7 +53276,7 @@
           <p:nvPr/>
         </p:nvPicPr>
         <p:blipFill rotWithShape="1">
-          <a:blip r:embed="rId6">
+          <a:blip r:embed="rId6" cstate="print">
             <a:extLst>
               <a:ext uri="{28A0092B-C50C-407E-A947-70E740481C1C}">
                 <a14:useLocalDpi xmlns:a14="http://schemas.microsoft.com/office/drawing/2010/main" val="0"/>
@@ -53188,7 +53288,7 @@
         </p:blipFill>
         <p:spPr>
           <a:xfrm>
-            <a:off x="3248756" y="6589155"/>
+            <a:off x="3258468" y="7115045"/>
             <a:ext cx="1809912" cy="1044115"/>
           </a:xfrm>
           <a:prstGeom prst="rect">
@@ -53532,7 +53632,7 @@
           <p:nvPr/>
         </p:nvPicPr>
         <p:blipFill>
-          <a:blip r:embed="rId7">
+          <a:blip r:embed="rId7" cstate="print">
             <a:extLst>
               <a:ext uri="{28A0092B-C50C-407E-A947-70E740481C1C}">
                 <a14:useLocalDpi xmlns:a14="http://schemas.microsoft.com/office/drawing/2010/main" val="0"/>
@@ -53545,7 +53645,7 @@
         </p:blipFill>
         <p:spPr>
           <a:xfrm>
-            <a:off x="1242244" y="8029314"/>
+            <a:off x="954212" y="8605378"/>
             <a:ext cx="3276364" cy="468052"/>
           </a:xfrm>
           <a:prstGeom prst="rect">
@@ -53562,7 +53662,7 @@
           <p:nvPr/>
         </p:nvPicPr>
         <p:blipFill>
-          <a:blip r:embed="rId8">
+          <a:blip r:embed="rId8" cstate="print">
             <a:extLst>
               <a:ext uri="{28A0092B-C50C-407E-A947-70E740481C1C}">
                 <a14:useLocalDpi xmlns:a14="http://schemas.microsoft.com/office/drawing/2010/main" val="0"/>
@@ -53575,7 +53675,7 @@
         </p:blipFill>
         <p:spPr>
           <a:xfrm>
-            <a:off x="1962324" y="8556353"/>
+            <a:off x="1855552" y="9123141"/>
             <a:ext cx="2050988" cy="229045"/>
           </a:xfrm>
           <a:prstGeom prst="rect">
@@ -53592,7 +53692,7 @@
           <p:nvPr/>
         </p:nvPicPr>
         <p:blipFill>
-          <a:blip r:embed="rId9">
+          <a:blip r:embed="rId9" cstate="print">
             <a:extLst>
               <a:ext uri="{28A0092B-C50C-407E-A947-70E740481C1C}">
                 <a14:useLocalDpi xmlns:a14="http://schemas.microsoft.com/office/drawing/2010/main" val="0"/>
@@ -53622,7 +53722,7 @@
           <p:nvPr/>
         </p:nvPicPr>
         <p:blipFill>
-          <a:blip r:embed="rId9">
+          <a:blip r:embed="rId9" cstate="print">
             <a:extLst>
               <a:ext uri="{28A0092B-C50C-407E-A947-70E740481C1C}">
                 <a14:useLocalDpi xmlns:a14="http://schemas.microsoft.com/office/drawing/2010/main" val="0"/>
@@ -53666,7 +53766,7 @@
             <p:nvPr/>
           </p:nvPicPr>
           <p:blipFill>
-            <a:blip r:embed="rId10">
+            <a:blip r:embed="rId10" cstate="print">
               <a:extLst>
                 <a:ext uri="{28A0092B-C50C-407E-A947-70E740481C1C}">
                   <a14:useLocalDpi xmlns:a14="http://schemas.microsoft.com/office/drawing/2010/main" val="0"/>
@@ -53742,7 +53842,7 @@
           <p:nvPr/>
         </p:nvPicPr>
         <p:blipFill>
-          <a:blip r:embed="rId11">
+          <a:blip r:embed="rId11" cstate="print">
             <a:extLst>
               <a:ext uri="{28A0092B-C50C-407E-A947-70E740481C1C}">
                 <a14:useLocalDpi xmlns:a14="http://schemas.microsoft.com/office/drawing/2010/main" val="0"/>
@@ -53776,7 +53876,7 @@
   <p:timing>
     <p:tnLst>
       <p:par>
-        <p:cTn xmlns:p14="http://schemas.microsoft.com/office/powerpoint/2010/main" id="1" dur="indefinite" restart="never" nodeType="tmRoot"/>
+        <p:cTn id="1" dur="indefinite" restart="never" nodeType="tmRoot"/>
       </p:par>
     </p:tnLst>
   </p:timing>

</xml_diff>

<commit_message>
poster remove building ding
</commit_message>
<xml_diff>
--- a/poster/poster.pptx
+++ b/poster/poster.pptx
@@ -48459,7 +48459,7 @@
         </p:nvSpPr>
         <p:spPr>
           <a:xfrm>
-            <a:off x="460400" y="4788955"/>
+            <a:off x="501370" y="4785526"/>
             <a:ext cx="4715073" cy="9829091"/>
           </a:xfrm>
           <a:prstGeom prst="rect">
@@ -48718,13 +48718,8 @@
             </a:r>
             <a:r>
               <a:rPr lang="en-GB" sz="1100" dirty="0" smtClean="0"/>
-              <a:t>file for </a:t>
-            </a:r>
-            <a:r>
-              <a:rPr lang="en-GB" sz="1100" smtClean="0"/>
-              <a:t>easy usage</a:t>
-            </a:r>
-            <a:endParaRPr lang="en-GB" sz="1100" dirty="0" smtClean="0"/>
+              <a:t>file, which contains the complete dataset.</a:t>
+            </a:r>
           </a:p>
           <a:p>
             <a:endParaRPr lang="en-GB" dirty="0" smtClean="0"/>
@@ -48734,7 +48729,7 @@
           </a:p>
           <a:p>
             <a:r>
-              <a:rPr lang="en-GB" b="1" dirty="0" smtClean="0"/>
+              <a:rPr lang="en-GB" sz="1200" b="1" dirty="0" smtClean="0"/>
               <a:t>Deep Convolutional Neural Networks </a:t>
             </a:r>
           </a:p>
@@ -48748,9 +48743,54 @@
           </a:p>
           <a:p>
             <a:r>
-              <a:rPr lang="en-GB" dirty="0" smtClean="0"/>
-              <a:t>General: </a:t>
-            </a:r>
+              <a:rPr lang="en-GB" sz="1100" dirty="0"/>
+              <a:t>Task: Object Recognition </a:t>
+            </a:r>
+            <a:r>
+              <a:rPr lang="en-GB" sz="1100" dirty="0" smtClean="0"/>
+              <a:t>as  </a:t>
+            </a:r>
+            <a:r>
+              <a:rPr lang="en-GB" sz="1100" dirty="0"/>
+              <a:t>a Classification </a:t>
+            </a:r>
+            <a:r>
+              <a:rPr lang="en-GB" sz="1100" dirty="0" smtClean="0"/>
+              <a:t>Problem</a:t>
+            </a:r>
+          </a:p>
+          <a:p>
+            <a:endParaRPr lang="en-GB" sz="1100" dirty="0"/>
+          </a:p>
+          <a:p>
+            <a:endParaRPr lang="en-GB" sz="1100" dirty="0" smtClean="0"/>
+          </a:p>
+          <a:p>
+            <a:endParaRPr lang="en-GB" sz="1100" dirty="0"/>
+          </a:p>
+          <a:p>
+            <a:endParaRPr lang="en-GB" sz="1100" dirty="0" smtClean="0"/>
+          </a:p>
+          <a:p>
+            <a:endParaRPr lang="en-GB" sz="1100" dirty="0"/>
+          </a:p>
+          <a:p>
+            <a:endParaRPr lang="en-GB" sz="1100" dirty="0" smtClean="0"/>
+          </a:p>
+          <a:p>
+            <a:endParaRPr lang="en-GB" sz="1100" dirty="0"/>
+          </a:p>
+          <a:p>
+            <a:endParaRPr lang="en-GB" sz="1100" dirty="0" smtClean="0"/>
+          </a:p>
+          <a:p>
+            <a:endParaRPr lang="en-GB" sz="1100" dirty="0" smtClean="0"/>
+          </a:p>
+          <a:p>
+            <a:endParaRPr lang="en-GB" sz="1100" dirty="0" smtClean="0"/>
+          </a:p>
+          <a:p>
+            <a:endParaRPr lang="en-GB" sz="1100" dirty="0"/>
           </a:p>
           <a:p>
             <a:pPr>
@@ -48758,32 +48798,7 @@
                 <a:spcPct val="50000"/>
               </a:lnSpc>
             </a:pPr>
-            <a:endParaRPr lang="en-GB" dirty="0" smtClean="0"/>
-          </a:p>
-          <a:p>
-            <a:pPr marL="228600" indent="-228600">
-              <a:buFont typeface="+mj-lt"/>
-              <a:buAutoNum type="arabicPeriod"/>
-            </a:pPr>
-            <a:r>
-              <a:rPr lang="en-GB" dirty="0" smtClean="0"/>
-              <a:t>Object </a:t>
-            </a:r>
-            <a:r>
-              <a:rPr lang="en-GB" dirty="0"/>
-              <a:t>Recognition </a:t>
-            </a:r>
-            <a:endParaRPr lang="en-GB" dirty="0" smtClean="0"/>
-          </a:p>
-          <a:p>
-            <a:r>
-              <a:rPr lang="en-GB" dirty="0"/>
-              <a:t> </a:t>
-            </a:r>
-            <a:r>
-              <a:rPr lang="en-GB" dirty="0" smtClean="0"/>
-              <a:t>     as a Classification Problem</a:t>
-            </a:r>
+            <a:endParaRPr lang="en-GB" sz="1100" dirty="0" smtClean="0"/>
           </a:p>
           <a:p>
             <a:pPr>
@@ -48791,174 +48806,7 @@
                 <a:spcPct val="50000"/>
               </a:lnSpc>
             </a:pPr>
-            <a:endParaRPr lang="en-GB" dirty="0"/>
-          </a:p>
-          <a:p>
-            <a:r>
-              <a:rPr lang="en-GB" dirty="0" smtClean="0"/>
-              <a:t>2.   Non-linearize system and get more </a:t>
-            </a:r>
-          </a:p>
-          <a:p>
-            <a:r>
-              <a:rPr lang="en-GB" dirty="0" smtClean="0"/>
-              <a:t>      parameters through getting </a:t>
-            </a:r>
-            <a:r>
-              <a:rPr lang="en-GB" i="1" dirty="0" smtClean="0"/>
-              <a:t>deeper:</a:t>
-            </a:r>
-          </a:p>
-          <a:p>
-            <a:endParaRPr lang="en-GB" i="1" dirty="0"/>
-          </a:p>
-          <a:p>
-            <a:endParaRPr lang="en-GB" dirty="0" smtClean="0"/>
-          </a:p>
-          <a:p>
-            <a:r>
-              <a:rPr lang="en-GB" i="1" dirty="0"/>
-              <a:t>	</a:t>
-            </a:r>
-            <a:endParaRPr lang="en-GB" i="1" dirty="0" smtClean="0"/>
-          </a:p>
-          <a:p>
-            <a:endParaRPr lang="en-GB" dirty="0"/>
-          </a:p>
-          <a:p>
-            <a:endParaRPr lang="en-GB" dirty="0" smtClean="0"/>
-          </a:p>
-          <a:p>
-            <a:endParaRPr lang="en-GB" dirty="0"/>
-          </a:p>
-          <a:p>
-            <a:endParaRPr lang="en-GB" dirty="0" smtClean="0"/>
-          </a:p>
-          <a:p>
-            <a:endParaRPr lang="en-GB" dirty="0" smtClean="0"/>
-          </a:p>
-          <a:p>
-            <a:pPr marL="228600" indent="-228600">
-              <a:buAutoNum type="arabicPeriod" startAt="3"/>
-            </a:pPr>
-            <a:r>
-              <a:rPr lang="en-GB" dirty="0" smtClean="0"/>
-              <a:t>Instead of matrix </a:t>
-            </a:r>
-            <a:r>
-              <a:rPr lang="en-GB" dirty="0"/>
-              <a:t>m</a:t>
-            </a:r>
-            <a:r>
-              <a:rPr lang="en-GB" dirty="0" smtClean="0"/>
-              <a:t>ultiplication of our Input, we deepen our network</a:t>
-            </a:r>
-          </a:p>
-          <a:p>
-            <a:r>
-              <a:rPr lang="en-GB" dirty="0" smtClean="0"/>
-              <a:t>       by using </a:t>
-            </a:r>
-            <a:r>
-              <a:rPr lang="en-GB" i="1" dirty="0" smtClean="0"/>
-              <a:t>convolutions and </a:t>
-            </a:r>
-            <a:r>
-              <a:rPr lang="en-GB" i="1" dirty="0"/>
-              <a:t>max-poolin</a:t>
-            </a:r>
-            <a:r>
-              <a:rPr lang="en-GB" dirty="0"/>
-              <a:t>g which </a:t>
-            </a:r>
-            <a:r>
-              <a:rPr lang="en-GB" dirty="0" smtClean="0"/>
-              <a:t>make use </a:t>
-            </a:r>
-            <a:r>
-              <a:rPr lang="en-GB" dirty="0"/>
-              <a:t>of </a:t>
-            </a:r>
-            <a:r>
-              <a:rPr lang="en-GB" dirty="0" smtClean="0"/>
-              <a:t>the</a:t>
-            </a:r>
-            <a:r>
-              <a:rPr lang="en-GB" i="1" dirty="0" smtClean="0"/>
-              <a:t>                       </a:t>
-            </a:r>
-          </a:p>
-          <a:p>
-            <a:r>
-              <a:rPr lang="en-GB" i="1" dirty="0"/>
-              <a:t> </a:t>
-            </a:r>
-            <a:r>
-              <a:rPr lang="en-GB" i="1" dirty="0" smtClean="0"/>
-              <a:t>      </a:t>
-            </a:r>
-            <a:r>
-              <a:rPr lang="en-GB" dirty="0" smtClean="0"/>
-              <a:t>spatial </a:t>
-            </a:r>
-            <a:r>
-              <a:rPr lang="en-GB" dirty="0"/>
-              <a:t>information of 3D </a:t>
-            </a:r>
-            <a:r>
-              <a:rPr lang="en-GB" dirty="0" smtClean="0"/>
-              <a:t>data.</a:t>
-            </a:r>
-            <a:endParaRPr lang="en-GB" dirty="0"/>
-          </a:p>
-          <a:p>
-            <a:endParaRPr lang="en-GB" i="1" dirty="0"/>
-          </a:p>
-          <a:p>
-            <a:endParaRPr lang="en-GB" i="1" dirty="0"/>
-          </a:p>
-          <a:p>
-            <a:endParaRPr lang="en-GB" i="1" dirty="0" smtClean="0"/>
-          </a:p>
-          <a:p>
-            <a:endParaRPr lang="en-GB" i="1" dirty="0"/>
-          </a:p>
-          <a:p>
-            <a:endParaRPr lang="en-GB" i="1" dirty="0" smtClean="0"/>
-          </a:p>
-          <a:p>
-            <a:endParaRPr lang="en-GB" i="1" dirty="0"/>
-          </a:p>
-          <a:p>
-            <a:endParaRPr lang="en-GB" i="1" dirty="0" smtClean="0"/>
-          </a:p>
-          <a:p>
-            <a:endParaRPr lang="en-GB" i="1" dirty="0"/>
-          </a:p>
-          <a:p>
-            <a:endParaRPr lang="en-GB" i="1" dirty="0"/>
-          </a:p>
-          <a:p>
-            <a:endParaRPr lang="en-GB" dirty="0" smtClean="0"/>
-          </a:p>
-          <a:p>
-            <a:r>
-              <a:rPr lang="en-GB" sz="800" dirty="0" smtClean="0"/>
-              <a:t>      Convolution: Shrink/Blur                                    Max Pooling: Non-linear down-sampling</a:t>
-            </a:r>
-            <a:endParaRPr lang="en-GB" sz="800" i="1" dirty="0"/>
-          </a:p>
-          <a:p>
-            <a:endParaRPr lang="en-GB" b="1" dirty="0" smtClean="0"/>
-          </a:p>
-          <a:p>
-            <a:endParaRPr lang="en-GB" b="1" dirty="0"/>
-          </a:p>
-          <a:p>
-            <a:r>
-              <a:rPr lang="en-GB" dirty="0" smtClean="0"/>
-              <a:t>    </a:t>
-            </a:r>
+            <a:endParaRPr lang="en-GB" sz="1100" dirty="0" smtClean="0"/>
           </a:p>
           <a:p>
             <a:pPr>
@@ -48966,272 +48814,106 @@
                 <a:spcPct val="50000"/>
               </a:lnSpc>
             </a:pPr>
-            <a:r>
-              <a:rPr lang="en-GB" dirty="0" smtClean="0"/>
-              <a:t> </a:t>
-            </a:r>
-            <a:endParaRPr lang="en-GB" dirty="0"/>
+            <a:endParaRPr lang="en-GB" sz="1100" dirty="0"/>
           </a:p>
           <a:p>
-            <a:pPr marL="171450" indent="-171450">
-              <a:lnSpc>
-                <a:spcPct val="50000"/>
-              </a:lnSpc>
-              <a:buFont typeface="Arial"/>
-              <a:buChar char="•"/>
-            </a:pPr>
-            <a:r>
-              <a:rPr lang="en-GB" dirty="0" smtClean="0"/>
-              <a:t>Result in </a:t>
-            </a:r>
-            <a:r>
-              <a:rPr lang="en-GB" dirty="0" err="1" smtClean="0"/>
-              <a:t>VoxNet</a:t>
-            </a:r>
-            <a:r>
-              <a:rPr lang="en-GB" dirty="0" smtClean="0"/>
-              <a:t> Case: </a:t>
+            <a:r>
+              <a:rPr lang="en-GB" sz="1100" dirty="0"/>
+              <a:t>1.    Neural Network: Non-Linear Activation</a:t>
             </a:r>
           </a:p>
           <a:p>
-            <a:pPr>
-              <a:lnSpc>
-                <a:spcPct val="50000"/>
-              </a:lnSpc>
-            </a:pPr>
-            <a:endParaRPr lang="en-GB" dirty="0"/>
+            <a:r>
+              <a:rPr lang="en-GB" sz="1100" dirty="0"/>
+              <a:t>       Function applied to Input to create</a:t>
+            </a:r>
           </a:p>
           <a:p>
-            <a:pPr>
-              <a:lnSpc>
-                <a:spcPct val="50000"/>
-              </a:lnSpc>
-            </a:pPr>
-            <a:r>
-              <a:rPr lang="en-GB" dirty="0"/>
-              <a:t> </a:t>
-            </a:r>
-            <a:r>
-              <a:rPr lang="en-GB" dirty="0" smtClean="0"/>
-              <a:t>    CNN of ~ 900t parameters</a:t>
+            <a:r>
+              <a:rPr lang="en-GB" sz="1100" dirty="0"/>
+              <a:t>       Non-Linear Output</a:t>
             </a:r>
           </a:p>
           <a:p>
-            <a:pPr>
-              <a:lnSpc>
-                <a:spcPct val="50000"/>
-              </a:lnSpc>
+            <a:pPr marL="228600" indent="-228600">
+              <a:buAutoNum type="arabicPeriod"/>
             </a:pPr>
-            <a:endParaRPr lang="en-GB" b="1" dirty="0" smtClean="0"/>
+            <a:endParaRPr lang="en-GB" sz="1100" dirty="0"/>
           </a:p>
           <a:p>
-            <a:pPr>
-              <a:lnSpc>
-                <a:spcPct val="50000"/>
-              </a:lnSpc>
+            <a:pPr marL="228600" indent="-228600">
+              <a:buAutoNum type="arabicPeriod"/>
             </a:pPr>
-            <a:endParaRPr lang="en-GB" b="1" dirty="0"/>
+            <a:endParaRPr lang="en-GB" sz="1100" dirty="0"/>
           </a:p>
           <a:p>
-            <a:pPr>
-              <a:lnSpc>
-                <a:spcPct val="50000"/>
-              </a:lnSpc>
+            <a:pPr marL="228600" indent="-228600">
+              <a:buAutoNum type="arabicPeriod"/>
             </a:pPr>
-            <a:endParaRPr lang="en-GB" b="1" dirty="0" smtClean="0"/>
+            <a:endParaRPr lang="en-GB" sz="1100" dirty="0"/>
           </a:p>
           <a:p>
-            <a:pPr>
-              <a:lnSpc>
-                <a:spcPct val="50000"/>
-              </a:lnSpc>
-            </a:pPr>
-            <a:endParaRPr lang="en-GB" b="1" dirty="0" smtClean="0"/>
+            <a:endParaRPr lang="en-GB" sz="1100" b="1" dirty="0"/>
           </a:p>
           <a:p>
-            <a:endParaRPr lang="en-GB" b="1" dirty="0" smtClean="0"/>
+            <a:endParaRPr lang="en-GB" sz="1100" dirty="0" smtClean="0"/>
           </a:p>
           <a:p>
-            <a:r>
-              <a:rPr lang="en-GB" i="1" dirty="0" smtClean="0"/>
-              <a:t>Contributed:</a:t>
-            </a:r>
+            <a:endParaRPr lang="en-GB" sz="1100" dirty="0" smtClean="0"/>
           </a:p>
           <a:p>
-            <a:endParaRPr lang="en-GB" dirty="0" smtClean="0"/>
+            <a:endParaRPr lang="en-GB" sz="1100" dirty="0" smtClean="0"/>
           </a:p>
           <a:p>
-            <a:pPr marL="171450" indent="-171450">
-              <a:buFont typeface="Arial"/>
-              <a:buChar char="•"/>
-            </a:pPr>
-            <a:r>
-              <a:rPr lang="en-GB" dirty="0" smtClean="0"/>
-              <a:t>Reimplementation of  </a:t>
-            </a:r>
+            <a:endParaRPr lang="en-GB" sz="1100" dirty="0"/>
           </a:p>
           <a:p>
-            <a:r>
-              <a:rPr lang="en-GB" dirty="0"/>
-              <a:t> </a:t>
-            </a:r>
-            <a:r>
-              <a:rPr lang="en-GB" dirty="0" smtClean="0"/>
-              <a:t>    Convolutional Neural Network </a:t>
+            <a:pPr marL="228600" indent="-228600">
+              <a:buAutoNum type="arabicPeriod" startAt="2"/>
+            </a:pPr>
+            <a:r>
+              <a:rPr lang="en-GB" sz="1100" dirty="0"/>
+              <a:t>Deep Neural Network: Multiple Connected Layers of weights,</a:t>
             </a:r>
           </a:p>
           <a:p>
             <a:r>
-              <a:rPr lang="en-GB" dirty="0"/>
-              <a:t> </a:t>
-            </a:r>
-            <a:r>
-              <a:rPr lang="en-GB" dirty="0" smtClean="0"/>
-              <a:t>    Model with </a:t>
-            </a:r>
-            <a:r>
-              <a:rPr lang="en-GB" dirty="0" err="1" smtClean="0"/>
-              <a:t>Keras</a:t>
-            </a:r>
-            <a:r>
-              <a:rPr lang="en-GB" dirty="0" smtClean="0"/>
-              <a:t> in Python,</a:t>
+              <a:rPr lang="en-GB" sz="1100" dirty="0"/>
+              <a:t>       which are </a:t>
+            </a:r>
+            <a:r>
+              <a:rPr lang="en-GB" sz="1100" dirty="0" smtClean="0"/>
+              <a:t>trained</a:t>
             </a:r>
           </a:p>
           <a:p>
-            <a:r>
-              <a:rPr lang="en-GB" dirty="0"/>
-              <a:t> </a:t>
-            </a:r>
-            <a:r>
-              <a:rPr lang="en-GB" dirty="0" smtClean="0"/>
-              <a:t>    supports rotation e.g. different</a:t>
-            </a:r>
+            <a:endParaRPr lang="en-GB" sz="1100" dirty="0"/>
           </a:p>
           <a:p>
-            <a:r>
-              <a:rPr lang="en-GB" dirty="0"/>
-              <a:t> </a:t>
-            </a:r>
-            <a:r>
-              <a:rPr lang="en-GB" dirty="0" smtClean="0"/>
-              <a:t>    views of same object</a:t>
+            <a:pPr marL="228600" indent="-228600">
+              <a:buAutoNum type="arabicPeriod" startAt="3"/>
+            </a:pPr>
+            <a:r>
+              <a:rPr lang="en-GB" sz="1100" dirty="0"/>
+              <a:t>Convolutional Nets: Convoluting multiple voxel of one layer </a:t>
+            </a:r>
+            <a:r>
+              <a:rPr lang="en-GB" sz="1100" dirty="0" smtClean="0"/>
+              <a:t>into </a:t>
+            </a:r>
+            <a:r>
+              <a:rPr lang="en-GB" sz="1100" dirty="0"/>
+              <a:t>a  stack of voxel or a activation map</a:t>
             </a:r>
           </a:p>
           <a:p>
-            <a:pPr>
-              <a:lnSpc>
-                <a:spcPct val="50000"/>
-              </a:lnSpc>
-            </a:pPr>
-            <a:endParaRPr lang="en-GB" dirty="0" smtClean="0"/>
+            <a:endParaRPr lang="en-GB" sz="1100" i="1" dirty="0"/>
           </a:p>
           <a:p>
-            <a:pPr>
-              <a:lnSpc>
-                <a:spcPct val="50000"/>
-              </a:lnSpc>
-            </a:pPr>
-            <a:endParaRPr lang="en-GB" dirty="0" smtClean="0"/>
+            <a:endParaRPr lang="en-GB" i="1" dirty="0" smtClean="0"/>
           </a:p>
           <a:p>
-            <a:pPr>
-              <a:lnSpc>
-                <a:spcPct val="50000"/>
-              </a:lnSpc>
-            </a:pPr>
-            <a:endParaRPr lang="en-GB" dirty="0" smtClean="0"/>
-          </a:p>
-          <a:p>
-            <a:pPr marL="171450" indent="-171450">
-              <a:buFont typeface="Arial"/>
-              <a:buChar char="•"/>
-            </a:pPr>
-            <a:r>
-              <a:rPr lang="en-GB" dirty="0" smtClean="0"/>
-              <a:t>Model Details: </a:t>
-            </a:r>
-          </a:p>
-          <a:p>
-            <a:pPr marL="352425" lvl="1" indent="-171450">
-              <a:buFont typeface="Arial"/>
-              <a:buChar char="•"/>
-            </a:pPr>
-            <a:r>
-              <a:rPr lang="en-GB" dirty="0" smtClean="0"/>
-              <a:t>Multiple 3D Convolutions</a:t>
-            </a:r>
-          </a:p>
-          <a:p>
-            <a:pPr marL="352425" lvl="1" indent="-171450">
-              <a:buFont typeface="Arial"/>
-              <a:buChar char="•"/>
-            </a:pPr>
-            <a:r>
-              <a:rPr lang="en-GB" dirty="0" smtClean="0"/>
-              <a:t>3D Max Pooling</a:t>
-            </a:r>
-          </a:p>
-          <a:p>
-            <a:pPr marL="352425" lvl="1" indent="-171450">
-              <a:buFont typeface="Arial"/>
-              <a:buChar char="•"/>
-            </a:pPr>
-            <a:r>
-              <a:rPr lang="en-GB" dirty="0" smtClean="0"/>
-              <a:t>Dense, </a:t>
-            </a:r>
-            <a:r>
-              <a:rPr lang="en-GB" dirty="0" err="1" smtClean="0"/>
-              <a:t>LeakyRelu</a:t>
-            </a:r>
-            <a:r>
-              <a:rPr lang="en-GB" dirty="0" smtClean="0"/>
-              <a:t>, etc.</a:t>
-            </a:r>
-          </a:p>
-          <a:p>
-            <a:pPr>
-              <a:lnSpc>
-                <a:spcPct val="50000"/>
-              </a:lnSpc>
-            </a:pPr>
-            <a:endParaRPr lang="en-GB" b="1" dirty="0" smtClean="0"/>
-          </a:p>
-          <a:p>
-            <a:pPr marL="171450" indent="-171450">
-              <a:buFont typeface="Arial"/>
-              <a:buChar char="•"/>
-            </a:pPr>
-            <a:endParaRPr lang="en-GB" dirty="0" smtClean="0"/>
-          </a:p>
-          <a:p>
-            <a:pPr marL="171450" indent="-171450">
-              <a:buFont typeface="Arial"/>
-              <a:buChar char="•"/>
-            </a:pPr>
-            <a:endParaRPr lang="en-GB" dirty="0" smtClean="0"/>
-          </a:p>
-          <a:p>
-            <a:pPr marL="171450" indent="-171450">
-              <a:buFont typeface="Arial"/>
-              <a:buChar char="•"/>
-            </a:pPr>
-            <a:endParaRPr lang="en-GB" dirty="0" smtClean="0"/>
-          </a:p>
-          <a:p>
-            <a:pPr marL="171450" indent="-171450">
-              <a:buFont typeface="Arial"/>
-              <a:buChar char="•"/>
-            </a:pPr>
-            <a:endParaRPr lang="en-GB" dirty="0"/>
-          </a:p>
-          <a:p>
-            <a:pPr marL="171450" indent="-171450">
-              <a:buFont typeface="Arial"/>
-              <a:buChar char="•"/>
-            </a:pPr>
-            <a:endParaRPr lang="en-US" dirty="0"/>
+            <a:endParaRPr lang="en-GB" i="1" dirty="0"/>
           </a:p>
         </p:txBody>
       </p:sp>
@@ -49427,45 +49109,33 @@
             <a:endParaRPr lang="en-US" b="1" dirty="0"/>
           </a:p>
           <a:p>
-            <a:r>
-              <a:rPr lang="en-US" i="1" dirty="0" smtClean="0"/>
-              <a:t>Contributed:</a:t>
-            </a:r>
-          </a:p>
-          <a:p>
-            <a:pPr>
-              <a:lnSpc>
-                <a:spcPct val="50000"/>
-              </a:lnSpc>
-            </a:pPr>
-            <a:endParaRPr lang="en-US" i="1" dirty="0"/>
-          </a:p>
-          <a:p>
             <a:pPr marL="171450" indent="-171450">
               <a:buFont typeface="Arial"/>
               <a:buChar char="•"/>
             </a:pPr>
             <a:r>
-              <a:rPr lang="en-US" dirty="0" smtClean="0"/>
-              <a:t>Setup and implementation on ETH Cluster ~ 20.000 cores  [4] </a:t>
-            </a:r>
-          </a:p>
-          <a:p>
-            <a:pPr marL="171450" indent="-171450">
-              <a:buFont typeface="Arial"/>
-              <a:buChar char="•"/>
-            </a:pPr>
-            <a:r>
-              <a:rPr lang="en-US" dirty="0" smtClean="0"/>
-              <a:t>Trained ModelNet10/40 for </a:t>
-            </a:r>
-            <a:r>
-              <a:rPr lang="en-US" dirty="0" err="1" smtClean="0"/>
-              <a:t>Xh</a:t>
-            </a:r>
-            <a:r>
-              <a:rPr lang="en-US" dirty="0" smtClean="0"/>
-              <a:t> / 12h on ???</a:t>
+              <a:rPr lang="de-CH" dirty="0" smtClean="0"/>
+              <a:t>The </a:t>
+            </a:r>
+            <a:r>
+              <a:rPr lang="de-CH" dirty="0"/>
+              <a:t>training process takes around </a:t>
+            </a:r>
+            <a:r>
+              <a:rPr lang="de-CH" dirty="0" smtClean="0"/>
+              <a:t>9 </a:t>
+            </a:r>
+            <a:r>
+              <a:rPr lang="de-CH" dirty="0"/>
+              <a:t>to </a:t>
+            </a:r>
+            <a:r>
+              <a:rPr lang="de-CH" dirty="0" smtClean="0"/>
+              <a:t>20 </a:t>
+            </a:r>
+            <a:r>
+              <a:rPr lang="de-CH" dirty="0"/>
+              <a:t>hours on a NVIDIA GTX 980TI (6GB) GPU depending on the size of the dataset</a:t>
             </a:r>
           </a:p>
           <a:p>
@@ -49492,60 +49162,33 @@
               <a:buChar char="•"/>
             </a:pPr>
             <a:r>
+              <a:rPr lang="en-GB" i="1" dirty="0"/>
+              <a:t>Contribution </a:t>
+            </a:r>
+            <a:r>
+              <a:rPr lang="en-GB" i="1" dirty="0" smtClean="0"/>
+              <a:t>: </a:t>
+            </a:r>
+            <a:r>
+              <a:rPr lang="de-CH" dirty="0" smtClean="0"/>
+              <a:t>The Keras framework with Theano backend in Python were used to implement the neural network. </a:t>
+            </a:r>
+          </a:p>
+          <a:p>
+            <a:endParaRPr lang="de-CH" dirty="0" smtClean="0"/>
+          </a:p>
+          <a:p>
+            <a:pPr marL="171450" indent="-171450">
+              <a:buFont typeface="Arial"/>
+              <a:buChar char="•"/>
+            </a:pPr>
+            <a:r>
               <a:rPr lang="de-CH" dirty="0" smtClean="0"/>
               <a:t>ETH </a:t>
             </a:r>
             <a:r>
-              <a:rPr lang="de-CH" dirty="0" err="1" smtClean="0"/>
-              <a:t>VoxNet</a:t>
-            </a:r>
-            <a:r>
               <a:rPr lang="de-CH" dirty="0" smtClean="0"/>
-              <a:t>: </a:t>
-            </a:r>
-            <a:r>
-              <a:rPr lang="de-CH" dirty="0" err="1" smtClean="0"/>
-              <a:t>reimplemented</a:t>
-            </a:r>
-            <a:r>
-              <a:rPr lang="de-CH" dirty="0" smtClean="0"/>
-              <a:t> </a:t>
-            </a:r>
-            <a:r>
-              <a:rPr lang="de-CH" dirty="0" err="1" smtClean="0"/>
-              <a:t>method</a:t>
-            </a:r>
-            <a:r>
-              <a:rPr lang="de-CH" dirty="0" smtClean="0"/>
-              <a:t> </a:t>
-            </a:r>
-            <a:r>
-              <a:rPr lang="de-CH" dirty="0" err="1" smtClean="0"/>
-              <a:t>achieves</a:t>
-            </a:r>
-            <a:r>
-              <a:rPr lang="de-CH" dirty="0" smtClean="0"/>
-              <a:t> same </a:t>
-            </a:r>
-            <a:r>
-              <a:rPr lang="de-CH" dirty="0" err="1" smtClean="0"/>
-              <a:t>result</a:t>
-            </a:r>
-            <a:r>
-              <a:rPr lang="de-CH" dirty="0" smtClean="0"/>
-              <a:t> </a:t>
-            </a:r>
-            <a:r>
-              <a:rPr lang="de-CH" dirty="0" err="1" smtClean="0"/>
-              <a:t>as</a:t>
-            </a:r>
-            <a:r>
-              <a:rPr lang="de-CH" dirty="0" smtClean="0"/>
-              <a:t> </a:t>
-            </a:r>
-            <a:r>
-              <a:rPr lang="de-CH" dirty="0" err="1" smtClean="0"/>
-              <a:t>orignal</a:t>
+              <a:t>VoxNet: reimplemented method achieves same result as orignal</a:t>
             </a:r>
             <a:endParaRPr lang="de-CH" dirty="0"/>
           </a:p>
@@ -50709,59 +50352,6 @@
               <a:t>/ </a:t>
             </a:r>
           </a:p>
-          <a:p>
-            <a:pPr>
-              <a:lnSpc>
-                <a:spcPct val="120000"/>
-              </a:lnSpc>
-            </a:pPr>
-            <a:r>
-              <a:rPr lang="de-DE" sz="600" b="1" dirty="0" smtClean="0">
-                <a:latin typeface="Arial (Textkörper)"/>
-                <a:cs typeface="Arial (Textkörper)"/>
-              </a:rPr>
-              <a:t>[</a:t>
-            </a:r>
-            <a:r>
-              <a:rPr lang="de-DE" sz="600" b="1" dirty="0">
-                <a:latin typeface="Arial (Textkörper)"/>
-                <a:cs typeface="Arial (Textkörper)"/>
-              </a:rPr>
-              <a:t>4] https://</a:t>
-            </a:r>
-            <a:r>
-              <a:rPr lang="de-DE" sz="600" b="1" dirty="0" err="1">
-                <a:latin typeface="Arial (Textkörper)"/>
-                <a:cs typeface="Arial (Textkörper)"/>
-              </a:rPr>
-              <a:t>ivc-support.ethz.ch</a:t>
-            </a:r>
-            <a:r>
-              <a:rPr lang="de-DE" sz="600" b="1" dirty="0">
-                <a:latin typeface="Arial (Textkörper)"/>
-                <a:cs typeface="Arial (Textkörper)"/>
-              </a:rPr>
-              <a:t>/</a:t>
-            </a:r>
-            <a:r>
-              <a:rPr lang="de-DE" sz="600" b="1" dirty="0" err="1">
-                <a:latin typeface="Arial (Textkörper)"/>
-                <a:cs typeface="Arial (Textkörper)"/>
-              </a:rPr>
-              <a:t>VisualLab</a:t>
-            </a:r>
-            <a:r>
-              <a:rPr lang="de-DE" sz="600" b="1" dirty="0">
-                <a:latin typeface="Arial (Textkörper)"/>
-                <a:cs typeface="Arial (Textkörper)"/>
-              </a:rPr>
-              <a:t>/VL02Servers01Euryale</a:t>
-            </a:r>
-            <a:endParaRPr lang="de-CH" sz="600" b="1" dirty="0">
-              <a:latin typeface="Arial (Textkörper)"/>
-              <a:cs typeface="Arial (Textkörper)"/>
-            </a:endParaRPr>
-          </a:p>
         </p:txBody>
       </p:sp>
       <p:sp>
@@ -50943,36 +50533,9 @@
           </a:lstStyle>
           <a:p>
             <a:r>
-              <a:rPr lang="de-CH" dirty="0"/>
-              <a:t>3	</a:t>
-            </a:r>
-            <a:r>
-              <a:rPr lang="de-CH" dirty="0" err="1" smtClean="0"/>
-              <a:t>DataSet</a:t>
-            </a:r>
-            <a:r>
               <a:rPr lang="de-CH" dirty="0" smtClean="0"/>
-              <a:t> / </a:t>
-            </a:r>
-            <a:r>
-              <a:rPr lang="de-CH" dirty="0" err="1"/>
-              <a:t>Princeton</a:t>
-            </a:r>
-            <a:r>
-              <a:rPr lang="de-CH" dirty="0"/>
-              <a:t> </a:t>
-            </a:r>
-            <a:r>
-              <a:rPr lang="de-CH" dirty="0" err="1" smtClean="0"/>
-              <a:t>ModelNet</a:t>
-            </a:r>
-            <a:r>
-              <a:rPr lang="de-CH" dirty="0" smtClean="0"/>
-              <a:t> [2]</a:t>
-            </a:r>
-            <a:endParaRPr lang="de-CH" dirty="0"/>
-          </a:p>
-          <a:p>
+              <a:t>Voxnet and Implementation</a:t>
+            </a:r>
             <a:endParaRPr lang="de-CH" dirty="0"/>
           </a:p>
         </p:txBody>
@@ -51155,196 +50718,13 @@
             </a:lvl9pPr>
           </a:lstStyle>
           <a:p>
-            <a:pPr marL="171450" indent="-171450">
-              <a:buFont typeface="Arial"/>
-              <a:buChar char="•"/>
-            </a:pPr>
-            <a:r>
-              <a:rPr lang="de-CH" dirty="0"/>
-              <a:t>C</a:t>
-            </a:r>
-            <a:r>
-              <a:rPr lang="de-CH" dirty="0" smtClean="0"/>
-              <a:t>lean </a:t>
-            </a:r>
-            <a:r>
-              <a:rPr lang="de-CH" dirty="0" err="1"/>
-              <a:t>collection</a:t>
-            </a:r>
-            <a:r>
-              <a:rPr lang="de-CH" dirty="0"/>
-              <a:t> </a:t>
-            </a:r>
-            <a:r>
-              <a:rPr lang="de-CH" dirty="0" err="1"/>
-              <a:t>of</a:t>
-            </a:r>
-            <a:r>
-              <a:rPr lang="de-CH" dirty="0"/>
-              <a:t> 3D CAD </a:t>
-            </a:r>
-            <a:r>
-              <a:rPr lang="de-CH" dirty="0" err="1"/>
-              <a:t>models</a:t>
-            </a:r>
-            <a:r>
-              <a:rPr lang="de-CH" dirty="0"/>
-              <a:t> </a:t>
-            </a:r>
-            <a:r>
-              <a:rPr lang="de-CH" dirty="0" err="1"/>
-              <a:t>for</a:t>
-            </a:r>
-            <a:r>
-              <a:rPr lang="de-CH" dirty="0"/>
-              <a:t> </a:t>
-            </a:r>
-            <a:r>
-              <a:rPr lang="de-CH" dirty="0" err="1" smtClean="0"/>
-              <a:t>objects</a:t>
-            </a:r>
-            <a:endParaRPr lang="de-CH" dirty="0"/>
-          </a:p>
-          <a:p>
-            <a:pPr marL="171450" indent="-171450">
-              <a:lnSpc>
-                <a:spcPct val="50000"/>
-              </a:lnSpc>
-              <a:buFont typeface="Arial"/>
-              <a:buChar char="•"/>
-            </a:pPr>
-            <a:endParaRPr lang="de-CH" dirty="0" smtClean="0"/>
-          </a:p>
-          <a:p>
-            <a:r>
-              <a:rPr lang="de-CH" b="1" dirty="0" err="1" smtClean="0"/>
-              <a:t>Building</a:t>
-            </a:r>
-            <a:r>
-              <a:rPr lang="de-CH" b="1" dirty="0" smtClean="0"/>
-              <a:t> </a:t>
-            </a:r>
-            <a:r>
-              <a:rPr lang="de-CH" b="1" dirty="0" err="1" smtClean="0"/>
-              <a:t>procedure</a:t>
-            </a:r>
-            <a:endParaRPr lang="de-CH" b="1" dirty="0"/>
-          </a:p>
-          <a:p>
-            <a:endParaRPr lang="de-CH" b="1" dirty="0" smtClean="0"/>
-          </a:p>
-          <a:p>
-            <a:pPr marL="171450" indent="-171450">
-              <a:buFont typeface="Arial"/>
-              <a:buChar char="•"/>
-            </a:pPr>
-            <a:r>
-              <a:rPr lang="de-CH" dirty="0" err="1" smtClean="0"/>
-              <a:t>compilation</a:t>
-            </a:r>
-            <a:r>
-              <a:rPr lang="de-CH" dirty="0" smtClean="0"/>
-              <a:t> </a:t>
-            </a:r>
-            <a:r>
-              <a:rPr lang="de-CH" dirty="0" err="1" smtClean="0"/>
-              <a:t>of</a:t>
-            </a:r>
-            <a:r>
-              <a:rPr lang="de-CH" dirty="0" smtClean="0"/>
-              <a:t> </a:t>
-            </a:r>
-            <a:r>
-              <a:rPr lang="de-CH" dirty="0" err="1" smtClean="0"/>
-              <a:t>list</a:t>
-            </a:r>
-            <a:r>
-              <a:rPr lang="de-CH" dirty="0" smtClean="0"/>
-              <a:t> </a:t>
-            </a:r>
-            <a:r>
-              <a:rPr lang="de-CH" dirty="0" err="1"/>
-              <a:t>of</a:t>
-            </a:r>
-            <a:r>
-              <a:rPr lang="de-CH" dirty="0"/>
-              <a:t> </a:t>
-            </a:r>
-            <a:r>
-              <a:rPr lang="de-CH" dirty="0" err="1" smtClean="0"/>
-              <a:t>most</a:t>
-            </a:r>
-            <a:r>
-              <a:rPr lang="de-CH" dirty="0" smtClean="0"/>
-              <a:t> </a:t>
-            </a:r>
-            <a:r>
-              <a:rPr lang="de-CH" dirty="0" err="1"/>
-              <a:t>common</a:t>
-            </a:r>
-            <a:r>
-              <a:rPr lang="de-CH" dirty="0"/>
-              <a:t> </a:t>
-            </a:r>
-            <a:r>
-              <a:rPr lang="de-CH" dirty="0" err="1"/>
-              <a:t>object</a:t>
-            </a:r>
-            <a:r>
-              <a:rPr lang="de-CH" dirty="0"/>
-              <a:t> </a:t>
-            </a:r>
-            <a:r>
-              <a:rPr lang="de-CH" dirty="0" err="1" smtClean="0"/>
-              <a:t>categories</a:t>
-            </a:r>
-            <a:r>
-              <a:rPr lang="de-CH" dirty="0" smtClean="0"/>
-              <a:t>, </a:t>
-            </a:r>
-            <a:r>
-              <a:rPr lang="de-CH" dirty="0" err="1"/>
-              <a:t>using</a:t>
-            </a:r>
-            <a:r>
-              <a:rPr lang="de-CH" dirty="0"/>
-              <a:t> </a:t>
-            </a:r>
-            <a:r>
-              <a:rPr lang="de-CH" dirty="0" err="1" smtClean="0"/>
-              <a:t>statistics</a:t>
-            </a:r>
-            <a:r>
-              <a:rPr lang="de-CH" dirty="0" smtClean="0"/>
-              <a:t> </a:t>
-            </a:r>
-            <a:r>
-              <a:rPr lang="de-CH" dirty="0" err="1"/>
-              <a:t>obtained</a:t>
-            </a:r>
-            <a:r>
-              <a:rPr lang="de-CH" dirty="0"/>
-              <a:t> </a:t>
-            </a:r>
-            <a:r>
-              <a:rPr lang="de-CH" dirty="0" err="1"/>
-              <a:t>from</a:t>
-            </a:r>
-            <a:r>
-              <a:rPr lang="de-CH" dirty="0"/>
-              <a:t> </a:t>
-            </a:r>
-            <a:r>
-              <a:rPr lang="de-CH" dirty="0" smtClean="0"/>
-              <a:t>SUN </a:t>
-            </a:r>
-            <a:r>
-              <a:rPr lang="de-CH" dirty="0" err="1" smtClean="0"/>
-              <a:t>database</a:t>
-            </a:r>
-            <a:r>
-              <a:rPr lang="de-CH" dirty="0" smtClean="0"/>
-              <a:t> [3]</a:t>
+            <a:r>
+              <a:rPr lang="en-GB" sz="1100" dirty="0" smtClean="0"/>
+              <a:t>Sequence </a:t>
+            </a:r>
+            <a:r>
+              <a:rPr lang="en-GB" sz="1100" dirty="0"/>
+              <a:t>of Multiple Convolutional Layer, Max Pooling Layers, followed by Fully Connected Layers</a:t>
             </a:r>
           </a:p>
           <a:p>
@@ -51353,7 +50733,50 @@
                 <a:spcPct val="50000"/>
               </a:lnSpc>
             </a:pPr>
-            <a:endParaRPr lang="de-CH" dirty="0" smtClean="0"/>
+            <a:endParaRPr lang="en-GB" sz="1100" dirty="0"/>
+          </a:p>
+          <a:p>
+            <a:pPr marL="171450" indent="-171450">
+              <a:lnSpc>
+                <a:spcPct val="50000"/>
+              </a:lnSpc>
+              <a:buFont typeface="Wingdings" panose="05000000000000000000" pitchFamily="2" charset="2"/>
+              <a:buChar char="Ø"/>
+            </a:pPr>
+            <a:r>
+              <a:rPr lang="en-GB" sz="1100" dirty="0"/>
+              <a:t> CNN more then 900k Parameter</a:t>
+            </a:r>
+          </a:p>
+          <a:p>
+            <a:pPr marL="171450" indent="-171450">
+              <a:lnSpc>
+                <a:spcPct val="100000"/>
+              </a:lnSpc>
+              <a:buFont typeface="Wingdings" panose="05000000000000000000" pitchFamily="2" charset="2"/>
+              <a:buChar char="Ø"/>
+            </a:pPr>
+            <a:r>
+              <a:rPr lang="en-GB" sz="1100" dirty="0"/>
+              <a:t>Activation: Leaky </a:t>
+            </a:r>
+            <a:r>
+              <a:rPr lang="en-GB" sz="1100" dirty="0" err="1"/>
+              <a:t>ReLu</a:t>
+            </a:r>
+            <a:endParaRPr lang="en-GB" sz="1100" dirty="0"/>
+          </a:p>
+          <a:p>
+            <a:endParaRPr lang="en-GB" sz="1100" b="1" dirty="0"/>
+          </a:p>
+          <a:p>
+            <a:r>
+              <a:rPr lang="en-GB" sz="1100" i="1" dirty="0"/>
+              <a:t>Contributed:</a:t>
+            </a:r>
+          </a:p>
+          <a:p>
+            <a:endParaRPr lang="en-GB" sz="1100" dirty="0"/>
           </a:p>
           <a:p>
             <a:pPr marL="171450" indent="-171450">
@@ -51361,146 +50784,48 @@
               <a:buChar char="•"/>
             </a:pPr>
             <a:r>
-              <a:rPr lang="de-CH" dirty="0" err="1" smtClean="0"/>
-              <a:t>collection</a:t>
-            </a:r>
-            <a:r>
-              <a:rPr lang="de-CH" dirty="0" smtClean="0"/>
-              <a:t> </a:t>
-            </a:r>
-            <a:r>
-              <a:rPr lang="de-CH" dirty="0" err="1" smtClean="0"/>
-              <a:t>of</a:t>
-            </a:r>
-            <a:r>
-              <a:rPr lang="de-CH" dirty="0" smtClean="0"/>
-              <a:t> 3D CAD </a:t>
-            </a:r>
-            <a:r>
-              <a:rPr lang="de-CH" dirty="0" err="1" smtClean="0"/>
-              <a:t>models</a:t>
-            </a:r>
-            <a:r>
-              <a:rPr lang="de-CH" dirty="0" smtClean="0"/>
-              <a:t> </a:t>
-            </a:r>
-            <a:r>
-              <a:rPr lang="de-CH" dirty="0" err="1" smtClean="0"/>
-              <a:t>for</a:t>
-            </a:r>
-            <a:r>
-              <a:rPr lang="de-CH" dirty="0" smtClean="0"/>
-              <a:t> </a:t>
-            </a:r>
-            <a:r>
-              <a:rPr lang="de-CH" dirty="0" err="1" smtClean="0"/>
-              <a:t>each</a:t>
-            </a:r>
-            <a:r>
-              <a:rPr lang="de-CH" dirty="0" smtClean="0"/>
-              <a:t> </a:t>
-            </a:r>
-            <a:r>
-              <a:rPr lang="de-CH" dirty="0" err="1" smtClean="0"/>
-              <a:t>object</a:t>
-            </a:r>
-            <a:r>
-              <a:rPr lang="de-CH" dirty="0" smtClean="0"/>
-              <a:t> </a:t>
-            </a:r>
-            <a:r>
-              <a:rPr lang="de-CH" dirty="0" err="1" smtClean="0"/>
-              <a:t>category</a:t>
-            </a:r>
-            <a:r>
-              <a:rPr lang="de-CH" dirty="0" smtClean="0"/>
-              <a:t> </a:t>
-            </a:r>
-            <a:r>
-              <a:rPr lang="de-CH" dirty="0" err="1" smtClean="0"/>
-              <a:t>using</a:t>
-            </a:r>
-            <a:r>
-              <a:rPr lang="de-CH" dirty="0" smtClean="0"/>
-              <a:t> online </a:t>
-            </a:r>
-            <a:r>
-              <a:rPr lang="de-CH" dirty="0" err="1" smtClean="0"/>
-              <a:t>search</a:t>
-            </a:r>
-            <a:r>
-              <a:rPr lang="de-CH" dirty="0" smtClean="0"/>
-              <a:t> </a:t>
-            </a:r>
-            <a:r>
-              <a:rPr lang="de-CH" dirty="0" err="1" smtClean="0"/>
-              <a:t>engines</a:t>
-            </a:r>
-            <a:r>
-              <a:rPr lang="de-CH" dirty="0" smtClean="0"/>
-              <a:t> </a:t>
-            </a:r>
-            <a:r>
-              <a:rPr lang="de-CH" dirty="0" err="1" smtClean="0"/>
-              <a:t>by</a:t>
-            </a:r>
-            <a:r>
-              <a:rPr lang="de-CH" dirty="0" smtClean="0"/>
-              <a:t> </a:t>
-            </a:r>
-            <a:r>
-              <a:rPr lang="de-CH" dirty="0" err="1" smtClean="0"/>
-              <a:t>querying</a:t>
-            </a:r>
-            <a:r>
-              <a:rPr lang="de-CH" dirty="0" smtClean="0"/>
-              <a:t> </a:t>
-            </a:r>
-            <a:r>
-              <a:rPr lang="de-CH" dirty="0" err="1" smtClean="0"/>
-              <a:t>for</a:t>
-            </a:r>
-            <a:r>
-              <a:rPr lang="de-CH" dirty="0" smtClean="0"/>
-              <a:t> </a:t>
-            </a:r>
-            <a:r>
-              <a:rPr lang="de-CH" dirty="0" err="1" smtClean="0"/>
-              <a:t>each</a:t>
-            </a:r>
-            <a:r>
-              <a:rPr lang="de-CH" dirty="0" smtClean="0"/>
-              <a:t> </a:t>
-            </a:r>
-            <a:r>
-              <a:rPr lang="de-CH" dirty="0" err="1" smtClean="0"/>
-              <a:t>object</a:t>
-            </a:r>
-            <a:r>
-              <a:rPr lang="de-CH" dirty="0" smtClean="0"/>
-              <a:t> </a:t>
-            </a:r>
-            <a:r>
-              <a:rPr lang="de-CH" dirty="0" err="1" smtClean="0"/>
-              <a:t>category</a:t>
-            </a:r>
-            <a:r>
-              <a:rPr lang="de-CH" dirty="0" smtClean="0"/>
-              <a:t> </a:t>
-            </a:r>
-            <a:r>
-              <a:rPr lang="de-CH" dirty="0" err="1" smtClean="0"/>
-              <a:t>term</a:t>
-            </a:r>
-            <a:endParaRPr lang="de-CH" dirty="0"/>
+              <a:rPr lang="en-GB" sz="1100" dirty="0"/>
+              <a:t>Reimplementation of  </a:t>
+            </a:r>
           </a:p>
           <a:p>
-            <a:pPr>
-              <a:lnSpc>
-                <a:spcPct val="50000"/>
-              </a:lnSpc>
-            </a:pPr>
-            <a:endParaRPr lang="de-CH" dirty="0" smtClean="0"/>
+            <a:r>
+              <a:rPr lang="en-GB" sz="1100" dirty="0"/>
+              <a:t>     Convolutional Neural Network </a:t>
+            </a:r>
+          </a:p>
+          <a:p>
+            <a:r>
+              <a:rPr lang="en-GB" sz="1100" dirty="0"/>
+              <a:t>     Model with </a:t>
+            </a:r>
+            <a:r>
+              <a:rPr lang="en-GB" sz="1100" dirty="0" err="1"/>
+              <a:t>Keras</a:t>
+            </a:r>
+            <a:r>
+              <a:rPr lang="en-GB" sz="1100" dirty="0"/>
+              <a:t> in Python,</a:t>
+            </a:r>
+          </a:p>
+          <a:p>
+            <a:r>
+              <a:rPr lang="en-GB" sz="1100" dirty="0"/>
+              <a:t>     supports rotation e.g. different</a:t>
+            </a:r>
+          </a:p>
+          <a:p>
+            <a:r>
+              <a:rPr lang="en-GB" sz="1100" dirty="0"/>
+              <a:t>     views of same </a:t>
+            </a:r>
+            <a:r>
+              <a:rPr lang="en-GB" sz="1100" dirty="0" smtClean="0"/>
+              <a:t>object</a:t>
+            </a:r>
+          </a:p>
+          <a:p>
+            <a:endParaRPr lang="de-CH" sz="1100" b="1" dirty="0"/>
           </a:p>
           <a:p>
             <a:pPr marL="171450" indent="-171450">
@@ -51508,206 +50833,16 @@
               <a:buChar char="•"/>
             </a:pPr>
             <a:r>
-              <a:rPr lang="de-CH" dirty="0" smtClean="0"/>
-              <a:t>human clean </a:t>
-            </a:r>
-            <a:r>
-              <a:rPr lang="de-CH" dirty="0" err="1" smtClean="0"/>
-              <a:t>up</a:t>
-            </a:r>
-            <a:r>
-              <a:rPr lang="de-CH" dirty="0" smtClean="0"/>
-              <a:t> </a:t>
-            </a:r>
-            <a:r>
-              <a:rPr lang="de-CH" dirty="0" err="1" smtClean="0"/>
-              <a:t>through</a:t>
-            </a:r>
-            <a:endParaRPr lang="de-CH" dirty="0" smtClean="0"/>
+              <a:rPr lang="en-GB" sz="1100" i="1" dirty="0"/>
+              <a:t>Contribution : </a:t>
+            </a:r>
+            <a:r>
+              <a:rPr lang="de-CH" sz="1100" dirty="0"/>
+              <a:t>The Keras framework with Theano backend in Python were used to implement the neural network. </a:t>
+            </a:r>
           </a:p>
           <a:p>
-            <a:r>
-              <a:rPr lang="de-CH" dirty="0"/>
-              <a:t> </a:t>
-            </a:r>
-            <a:r>
-              <a:rPr lang="de-CH" dirty="0" smtClean="0"/>
-              <a:t>    Amazon </a:t>
-            </a:r>
-            <a:r>
-              <a:rPr lang="de-CH" dirty="0" err="1" smtClean="0"/>
-              <a:t>Mechanical</a:t>
-            </a:r>
-            <a:r>
-              <a:rPr lang="de-CH" dirty="0" smtClean="0"/>
-              <a:t> Turk </a:t>
-            </a:r>
-            <a:r>
-              <a:rPr lang="de-CH" dirty="0" err="1" smtClean="0"/>
-              <a:t>to</a:t>
-            </a:r>
-            <a:endParaRPr lang="de-CH" dirty="0" smtClean="0"/>
-          </a:p>
-          <a:p>
-            <a:r>
-              <a:rPr lang="de-CH" dirty="0"/>
-              <a:t> </a:t>
-            </a:r>
-            <a:r>
-              <a:rPr lang="de-CH" dirty="0" smtClean="0"/>
-              <a:t>    </a:t>
-            </a:r>
-            <a:r>
-              <a:rPr lang="de-CH" dirty="0" err="1" smtClean="0"/>
-              <a:t>decide</a:t>
-            </a:r>
-            <a:r>
-              <a:rPr lang="de-CH" dirty="0" smtClean="0"/>
-              <a:t> </a:t>
-            </a:r>
-            <a:r>
-              <a:rPr lang="de-CH" dirty="0" err="1" smtClean="0"/>
-              <a:t>whether</a:t>
-            </a:r>
-            <a:r>
-              <a:rPr lang="de-CH" dirty="0" smtClean="0"/>
-              <a:t> </a:t>
-            </a:r>
-            <a:r>
-              <a:rPr lang="de-CH" dirty="0" err="1" smtClean="0"/>
-              <a:t>each</a:t>
-            </a:r>
-            <a:r>
-              <a:rPr lang="de-CH" dirty="0" smtClean="0"/>
-              <a:t> CAD </a:t>
-            </a:r>
-          </a:p>
-          <a:p>
-            <a:r>
-              <a:rPr lang="de-CH" dirty="0"/>
-              <a:t> </a:t>
-            </a:r>
-            <a:r>
-              <a:rPr lang="de-CH" dirty="0" smtClean="0"/>
-              <a:t>    </a:t>
-            </a:r>
-            <a:r>
-              <a:rPr lang="de-CH" dirty="0" err="1" smtClean="0"/>
-              <a:t>model</a:t>
-            </a:r>
-            <a:r>
-              <a:rPr lang="de-CH" dirty="0" smtClean="0"/>
-              <a:t> </a:t>
-            </a:r>
-            <a:r>
-              <a:rPr lang="de-CH" dirty="0" err="1" smtClean="0"/>
-              <a:t>belongs</a:t>
-            </a:r>
-            <a:r>
-              <a:rPr lang="de-CH" dirty="0" smtClean="0"/>
-              <a:t> </a:t>
-            </a:r>
-            <a:r>
-              <a:rPr lang="de-CH" dirty="0" err="1" smtClean="0"/>
-              <a:t>to</a:t>
-            </a:r>
-            <a:r>
-              <a:rPr lang="de-CH" dirty="0" smtClean="0"/>
-              <a:t> </a:t>
-            </a:r>
-            <a:r>
-              <a:rPr lang="de-CH" dirty="0" err="1" smtClean="0"/>
-              <a:t>specified</a:t>
-            </a:r>
-            <a:endParaRPr lang="de-CH" dirty="0" smtClean="0"/>
-          </a:p>
-          <a:p>
-            <a:r>
-              <a:rPr lang="de-CH" dirty="0"/>
-              <a:t> </a:t>
-            </a:r>
-            <a:r>
-              <a:rPr lang="de-CH" dirty="0" smtClean="0"/>
-              <a:t>    </a:t>
-            </a:r>
-            <a:r>
-              <a:rPr lang="de-CH" dirty="0" err="1" smtClean="0"/>
-              <a:t>cateogries</a:t>
-            </a:r>
-            <a:endParaRPr lang="de-CH" dirty="0"/>
-          </a:p>
-          <a:p>
-            <a:pPr>
-              <a:lnSpc>
-                <a:spcPct val="50000"/>
-              </a:lnSpc>
-            </a:pPr>
-            <a:endParaRPr lang="de-CH" dirty="0"/>
-          </a:p>
-          <a:p>
-            <a:pPr marL="171450" indent="-171450">
-              <a:buFont typeface="Arial"/>
-              <a:buChar char="•"/>
-            </a:pPr>
-            <a:r>
-              <a:rPr lang="de-CH" dirty="0" err="1" smtClean="0"/>
-              <a:t>manually</a:t>
-            </a:r>
-            <a:r>
-              <a:rPr lang="de-CH" dirty="0" smtClean="0"/>
-              <a:t> </a:t>
-            </a:r>
-            <a:r>
-              <a:rPr lang="de-CH" dirty="0" err="1" smtClean="0"/>
-              <a:t>alignment</a:t>
-            </a:r>
-            <a:r>
-              <a:rPr lang="de-CH" dirty="0" smtClean="0"/>
-              <a:t> </a:t>
-            </a:r>
-            <a:r>
-              <a:rPr lang="de-CH" dirty="0" err="1" smtClean="0"/>
-              <a:t>of</a:t>
-            </a:r>
-            <a:r>
-              <a:rPr lang="de-CH" dirty="0" smtClean="0"/>
-              <a:t> </a:t>
-            </a:r>
-          </a:p>
-          <a:p>
-            <a:r>
-              <a:rPr lang="de-CH" dirty="0"/>
-              <a:t> </a:t>
-            </a:r>
-            <a:r>
-              <a:rPr lang="de-CH" dirty="0" smtClean="0"/>
-              <a:t>    </a:t>
-            </a:r>
-            <a:r>
-              <a:rPr lang="de-CH" dirty="0" err="1" smtClean="0"/>
-              <a:t>orientation</a:t>
-            </a:r>
-            <a:r>
-              <a:rPr lang="de-CH" dirty="0" smtClean="0"/>
-              <a:t> </a:t>
-            </a:r>
-            <a:r>
-              <a:rPr lang="de-CH" dirty="0" err="1"/>
-              <a:t>of</a:t>
-            </a:r>
-            <a:r>
-              <a:rPr lang="de-CH" dirty="0"/>
-              <a:t> </a:t>
-            </a:r>
-            <a:r>
-              <a:rPr lang="de-CH" dirty="0" smtClean="0"/>
-              <a:t>CAD </a:t>
-            </a:r>
-            <a:r>
-              <a:rPr lang="de-CH" dirty="0" err="1" smtClean="0"/>
-              <a:t>models</a:t>
-            </a:r>
-            <a:endParaRPr lang="de-CH" dirty="0"/>
+            <a:endParaRPr lang="en-GB" sz="1100" dirty="0"/>
           </a:p>
         </p:txBody>
       </p:sp>
@@ -52153,7 +51288,7 @@
         </p:blipFill>
         <p:spPr>
           <a:xfrm>
-            <a:off x="3516546" y="5040982"/>
+            <a:off x="3585379" y="5039725"/>
             <a:ext cx="1631064" cy="823749"/>
           </a:xfrm>
           <a:prstGeom prst="rect">
@@ -52372,19 +51507,23 @@
           <a:p>
             <a:r>
               <a:rPr lang="en-US" dirty="0"/>
-              <a:t> 3D information / Point cloud of object       |       </a:t>
+              <a:t> 3D information / </a:t>
+            </a:r>
+            <a:r>
+              <a:rPr lang="en-US" dirty="0" smtClean="0"/>
+              <a:t>Point </a:t>
+            </a:r>
+            <a:r>
+              <a:rPr lang="en-US" dirty="0"/>
+              <a:t>cloud of object       |       </a:t>
             </a:r>
             <a:r>
               <a:rPr lang="en-US" dirty="0" smtClean="0"/>
               <a:t>  </a:t>
             </a:r>
             <a:r>
-              <a:rPr lang="en-US" dirty="0"/>
-              <a:t>Occupancy </a:t>
-            </a:r>
-            <a:r>
               <a:rPr lang="en-US" dirty="0" smtClean="0"/>
-              <a:t>Grid            </a:t>
+              <a:t>Occupancy Grid            </a:t>
             </a:r>
             <a:r>
               <a:rPr lang="en-US" dirty="0"/>
@@ -52395,9 +51534,10 @@
               <a:t> </a:t>
             </a:r>
             <a:r>
-              <a:rPr lang="en-US" dirty="0"/>
+              <a:rPr lang="en-US" dirty="0" smtClean="0"/>
               <a:t>Object Recognition</a:t>
             </a:r>
+            <a:endParaRPr lang="en-US" dirty="0"/>
           </a:p>
         </p:txBody>
       </p:sp>
@@ -52479,66 +51619,6 @@
           </a:p>
         </p:txBody>
       </p:sp>
-      <p:pic>
-        <p:nvPicPr>
-          <p:cNvPr id="42" name="Inhaltsplatzhalter 1"/>
-          <p:cNvPicPr>
-            <a:picLocks noChangeAspect="1"/>
-          </p:cNvPicPr>
-          <p:nvPr/>
-        </p:nvPicPr>
-        <p:blipFill>
-          <a:blip r:embed="rId4" cstate="print">
-            <a:extLst>
-              <a:ext uri="{28A0092B-C50C-407E-A947-70E740481C1C}">
-                <a14:useLocalDpi xmlns:a14="http://schemas.microsoft.com/office/drawing/2010/main" val="0"/>
-              </a:ext>
-            </a:extLst>
-          </a:blip>
-          <a:stretch>
-            <a:fillRect/>
-          </a:stretch>
-        </p:blipFill>
-        <p:spPr>
-          <a:xfrm>
-            <a:off x="2682404" y="11326360"/>
-            <a:ext cx="2448272" cy="3256439"/>
-          </a:xfrm>
-          <a:prstGeom prst="rect">
-            <a:avLst/>
-          </a:prstGeom>
-        </p:spPr>
-      </p:pic>
-      <p:pic>
-        <p:nvPicPr>
-          <p:cNvPr id="44" name="Inhaltsplatzhalter 6"/>
-          <p:cNvPicPr>
-            <a:picLocks noChangeAspect="1"/>
-          </p:cNvPicPr>
-          <p:nvPr/>
-        </p:nvPicPr>
-        <p:blipFill>
-          <a:blip r:embed="rId5" cstate="print">
-            <a:extLst>
-              <a:ext uri="{28A0092B-C50C-407E-A947-70E740481C1C}">
-                <a14:useLocalDpi xmlns:a14="http://schemas.microsoft.com/office/drawing/2010/main" val="0"/>
-              </a:ext>
-            </a:extLst>
-          </a:blip>
-          <a:stretch>
-            <a:fillRect/>
-          </a:stretch>
-        </p:blipFill>
-        <p:spPr>
-          <a:xfrm>
-            <a:off x="7614258" y="6317915"/>
-            <a:ext cx="2615233" cy="1423367"/>
-          </a:xfrm>
-          <a:prstGeom prst="rect">
-            <a:avLst/>
-          </a:prstGeom>
-        </p:spPr>
-      </p:pic>
       <p:graphicFrame>
         <p:nvGraphicFramePr>
           <p:cNvPr id="11" name="Tabelle 10"/>
@@ -52548,14 +51628,14 @@
           <p:nvPr>
             <p:extLst>
               <p:ext uri="{D42A27DB-BD31-4B8C-83A1-F6EECF244321}">
-                <p14:modId xmlns:p14="http://schemas.microsoft.com/office/powerpoint/2010/main" val="3529637921"/>
+                <p14:modId xmlns:p14="http://schemas.microsoft.com/office/powerpoint/2010/main" val="545030033"/>
               </p:ext>
             </p:extLst>
           </p:nvPr>
         </p:nvGraphicFramePr>
         <p:xfrm>
-          <a:off x="6246800" y="9937526"/>
-          <a:ext cx="3240360" cy="1219200"/>
+          <a:off x="6282803" y="10273470"/>
+          <a:ext cx="3204357" cy="1219200"/>
         </p:xfrm>
         <a:graphic>
           <a:graphicData uri="http://schemas.openxmlformats.org/drawingml/2006/table">
@@ -52564,21 +51644,21 @@
                 <a:tableStyleId>{00A15C55-8517-42AA-B614-E9B94910E393}</a:tableStyleId>
               </a:tblPr>
               <a:tblGrid>
-                <a:gridCol w="1080120">
+                <a:gridCol w="1068119">
                   <a:extLst>
                     <a:ext uri="{9D8B030D-6E8A-4147-A177-3AD203B41FA5}">
                       <a16:colId xmlns:a16="http://schemas.microsoft.com/office/drawing/2014/main" val="20000"/>
                     </a:ext>
                   </a:extLst>
                 </a:gridCol>
-                <a:gridCol w="1080120">
+                <a:gridCol w="1068119">
                   <a:extLst>
                     <a:ext uri="{9D8B030D-6E8A-4147-A177-3AD203B41FA5}">
                       <a16:colId xmlns:a16="http://schemas.microsoft.com/office/drawing/2014/main" val="20001"/>
                     </a:ext>
                   </a:extLst>
                 </a:gridCol>
-                <a:gridCol w="1080120">
+                <a:gridCol w="1068119">
                   <a:extLst>
                     <a:ext uri="{9D8B030D-6E8A-4147-A177-3AD203B41FA5}">
                       <a16:colId xmlns:a16="http://schemas.microsoft.com/office/drawing/2014/main" val="20002"/>
@@ -52586,7 +51666,7 @@
                   </a:extLst>
                 </a:gridCol>
               </a:tblGrid>
-              <a:tr h="530159">
+              <a:tr h="574598">
                 <a:tc>
                   <a:txBody>
                     <a:bodyPr/>
@@ -52768,7 +51848,7 @@
                   </a:ext>
                 </a:extLst>
               </a:tr>
-              <a:tr h="195322">
+              <a:tr h="211693">
                 <a:tc>
                   <a:txBody>
                     <a:bodyPr/>
@@ -52929,7 +52009,7 @@
                   </a:ext>
                 </a:extLst>
               </a:tr>
-              <a:tr h="195322">
+              <a:tr h="211693">
                 <a:tc>
                   <a:txBody>
                     <a:bodyPr/>
@@ -53082,7 +52162,7 @@
                   </a:ext>
                 </a:extLst>
               </a:tr>
-              <a:tr h="195322">
+              <a:tr h="211693">
                 <a:tc>
                   <a:txBody>
                     <a:bodyPr/>
@@ -53276,7 +52356,7 @@
           <p:nvPr/>
         </p:nvPicPr>
         <p:blipFill rotWithShape="1">
-          <a:blip r:embed="rId6" cstate="print">
+          <a:blip r:embed="rId4" cstate="print">
             <a:extLst>
               <a:ext uri="{28A0092B-C50C-407E-A947-70E740481C1C}">
                 <a14:useLocalDpi xmlns:a14="http://schemas.microsoft.com/office/drawing/2010/main" val="0"/>
@@ -53288,8 +52368,8 @@
         </p:blipFill>
         <p:spPr>
           <a:xfrm>
-            <a:off x="3258468" y="7115045"/>
-            <a:ext cx="1809912" cy="1044115"/>
+            <a:off x="1278249" y="7368536"/>
+            <a:ext cx="2412268" cy="1391606"/>
           </a:xfrm>
           <a:prstGeom prst="rect">
             <a:avLst/>
@@ -53623,126 +52703,6 @@
           </a:p>
         </p:txBody>
       </p:sp>
-      <p:pic>
-        <p:nvPicPr>
-          <p:cNvPr id="3" name="Bild 2" descr="Screen Shot 2016-05-24 at 18.10.55.png"/>
-          <p:cNvPicPr>
-            <a:picLocks noChangeAspect="1"/>
-          </p:cNvPicPr>
-          <p:nvPr/>
-        </p:nvPicPr>
-        <p:blipFill>
-          <a:blip r:embed="rId7" cstate="print">
-            <a:extLst>
-              <a:ext uri="{28A0092B-C50C-407E-A947-70E740481C1C}">
-                <a14:useLocalDpi xmlns:a14="http://schemas.microsoft.com/office/drawing/2010/main" val="0"/>
-              </a:ext>
-            </a:extLst>
-          </a:blip>
-          <a:stretch>
-            <a:fillRect/>
-          </a:stretch>
-        </p:blipFill>
-        <p:spPr>
-          <a:xfrm>
-            <a:off x="954212" y="8605378"/>
-            <a:ext cx="3276364" cy="468052"/>
-          </a:xfrm>
-          <a:prstGeom prst="rect">
-            <a:avLst/>
-          </a:prstGeom>
-        </p:spPr>
-      </p:pic>
-      <p:pic>
-        <p:nvPicPr>
-          <p:cNvPr id="7" name="Bild 6" descr="Screen Shot 2016-05-24 at 18.17.44.png"/>
-          <p:cNvPicPr>
-            <a:picLocks noChangeAspect="1"/>
-          </p:cNvPicPr>
-          <p:nvPr/>
-        </p:nvPicPr>
-        <p:blipFill>
-          <a:blip r:embed="rId8" cstate="print">
-            <a:extLst>
-              <a:ext uri="{28A0092B-C50C-407E-A947-70E740481C1C}">
-                <a14:useLocalDpi xmlns:a14="http://schemas.microsoft.com/office/drawing/2010/main" val="0"/>
-              </a:ext>
-            </a:extLst>
-          </a:blip>
-          <a:stretch>
-            <a:fillRect/>
-          </a:stretch>
-        </p:blipFill>
-        <p:spPr>
-          <a:xfrm>
-            <a:off x="1855552" y="9123141"/>
-            <a:ext cx="2050988" cy="229045"/>
-          </a:xfrm>
-          <a:prstGeom prst="rect">
-            <a:avLst/>
-          </a:prstGeom>
-        </p:spPr>
-      </p:pic>
-      <p:pic>
-        <p:nvPicPr>
-          <p:cNvPr id="10" name="Bild 9" descr="Screen Shot 2016-05-24 at 18.24.13.png"/>
-          <p:cNvPicPr>
-            <a:picLocks noChangeAspect="1"/>
-          </p:cNvPicPr>
-          <p:nvPr/>
-        </p:nvPicPr>
-        <p:blipFill>
-          <a:blip r:embed="rId9" cstate="print">
-            <a:extLst>
-              <a:ext uri="{28A0092B-C50C-407E-A947-70E740481C1C}">
-                <a14:useLocalDpi xmlns:a14="http://schemas.microsoft.com/office/drawing/2010/main" val="0"/>
-              </a:ext>
-            </a:extLst>
-          </a:blip>
-          <a:stretch>
-            <a:fillRect/>
-          </a:stretch>
-        </p:blipFill>
-        <p:spPr>
-          <a:xfrm>
-            <a:off x="2356537" y="8461362"/>
-            <a:ext cx="109843" cy="144016"/>
-          </a:xfrm>
-          <a:prstGeom prst="rect">
-            <a:avLst/>
-          </a:prstGeom>
-        </p:spPr>
-      </p:pic>
-      <p:pic>
-        <p:nvPicPr>
-          <p:cNvPr id="29" name="Bild 28" descr="Screen Shot 2016-05-24 at 18.24.13.png"/>
-          <p:cNvPicPr>
-            <a:picLocks noChangeAspect="1"/>
-          </p:cNvPicPr>
-          <p:nvPr/>
-        </p:nvPicPr>
-        <p:blipFill>
-          <a:blip r:embed="rId9" cstate="print">
-            <a:extLst>
-              <a:ext uri="{28A0092B-C50C-407E-A947-70E740481C1C}">
-                <a14:useLocalDpi xmlns:a14="http://schemas.microsoft.com/office/drawing/2010/main" val="0"/>
-              </a:ext>
-            </a:extLst>
-          </a:blip>
-          <a:stretch>
-            <a:fillRect/>
-          </a:stretch>
-        </p:blipFill>
-        <p:spPr>
-          <a:xfrm>
-            <a:off x="3436657" y="8461362"/>
-            <a:ext cx="109843" cy="144016"/>
-          </a:xfrm>
-          <a:prstGeom prst="rect">
-            <a:avLst/>
-          </a:prstGeom>
-        </p:spPr>
-      </p:pic>
       <p:grpSp>
         <p:nvGrpSpPr>
           <p:cNvPr id="17" name="Gruppierung 16"/>
@@ -53751,7 +52711,7 @@
         </p:nvGrpSpPr>
         <p:grpSpPr>
           <a:xfrm>
-            <a:off x="688144" y="9611875"/>
+            <a:off x="767410" y="11981141"/>
             <a:ext cx="1994260" cy="1225751"/>
             <a:chOff x="3546500" y="8702515"/>
             <a:chExt cx="6854800" cy="4394103"/>
@@ -53766,7 +52726,7 @@
             <p:nvPr/>
           </p:nvPicPr>
           <p:blipFill>
-            <a:blip r:embed="rId10" cstate="print">
+            <a:blip r:embed="rId5" cstate="print">
               <a:extLst>
                 <a:ext uri="{28A0092B-C50C-407E-A947-70E740481C1C}">
                   <a14:useLocalDpi xmlns:a14="http://schemas.microsoft.com/office/drawing/2010/main" val="0"/>
@@ -53842,7 +52802,7 @@
           <p:nvPr/>
         </p:nvPicPr>
         <p:blipFill>
-          <a:blip r:embed="rId11" cstate="print">
+          <a:blip r:embed="rId6" cstate="print">
             <a:extLst>
               <a:ext uri="{28A0092B-C50C-407E-A947-70E740481C1C}">
                 <a14:useLocalDpi xmlns:a14="http://schemas.microsoft.com/office/drawing/2010/main" val="0"/>
@@ -53855,7 +52815,7 @@
         </p:blipFill>
         <p:spPr>
           <a:xfrm>
-            <a:off x="3053050" y="9469474"/>
+            <a:off x="3071314" y="11857743"/>
             <a:ext cx="1861602" cy="1475520"/>
           </a:xfrm>
           <a:prstGeom prst="rect">
@@ -53863,6 +52823,171 @@
           </a:prstGeom>
         </p:spPr>
       </p:pic>
+      <p:pic>
+        <p:nvPicPr>
+          <p:cNvPr id="32" name="Inhaltsplatzhalter 1"/>
+          <p:cNvPicPr>
+            <a:picLocks noChangeAspect="1"/>
+          </p:cNvPicPr>
+          <p:nvPr/>
+        </p:nvPicPr>
+        <p:blipFill>
+          <a:blip r:embed="rId7" cstate="print">
+            <a:extLst>
+              <a:ext uri="{28A0092B-C50C-407E-A947-70E740481C1C}">
+                <a14:useLocalDpi xmlns:a14="http://schemas.microsoft.com/office/drawing/2010/main" val="0"/>
+              </a:ext>
+            </a:extLst>
+          </a:blip>
+          <a:stretch>
+            <a:fillRect/>
+          </a:stretch>
+        </p:blipFill>
+        <p:spPr>
+          <a:xfrm>
+            <a:off x="8120981" y="5516263"/>
+            <a:ext cx="2448272" cy="3256439"/>
+          </a:xfrm>
+          <a:prstGeom prst="rect">
+            <a:avLst/>
+          </a:prstGeom>
+        </p:spPr>
+      </p:pic>
+      <p:grpSp>
+        <p:nvGrpSpPr>
+          <p:cNvPr id="33" name="Group 32"/>
+          <p:cNvGrpSpPr/>
+          <p:nvPr/>
+        </p:nvGrpSpPr>
+        <p:grpSpPr>
+          <a:xfrm>
+            <a:off x="960831" y="9800442"/>
+            <a:ext cx="3276364" cy="715190"/>
+            <a:chOff x="710850" y="8162013"/>
+            <a:chExt cx="3276364" cy="715190"/>
+          </a:xfrm>
+        </p:grpSpPr>
+        <p:pic>
+          <p:nvPicPr>
+            <p:cNvPr id="35" name="Bild 2" descr="Screen Shot 2016-05-24 at 18.10.55.png"/>
+            <p:cNvPicPr>
+              <a:picLocks noChangeAspect="1"/>
+            </p:cNvPicPr>
+            <p:nvPr/>
+          </p:nvPicPr>
+          <p:blipFill>
+            <a:blip r:embed="rId8" cstate="print">
+              <a:extLst>
+                <a:ext uri="{28A0092B-C50C-407E-A947-70E740481C1C}">
+                  <a14:useLocalDpi xmlns:a14="http://schemas.microsoft.com/office/drawing/2010/main" val="0"/>
+                </a:ext>
+              </a:extLst>
+            </a:blip>
+            <a:stretch>
+              <a:fillRect/>
+            </a:stretch>
+          </p:blipFill>
+          <p:spPr>
+            <a:xfrm>
+              <a:off x="710850" y="8162013"/>
+              <a:ext cx="3276364" cy="468052"/>
+            </a:xfrm>
+            <a:prstGeom prst="rect">
+              <a:avLst/>
+            </a:prstGeom>
+          </p:spPr>
+        </p:pic>
+        <p:pic>
+          <p:nvPicPr>
+            <p:cNvPr id="36" name="Bild 6" descr="Screen Shot 2016-05-24 at 18.17.44.png"/>
+            <p:cNvPicPr>
+              <a:picLocks noChangeAspect="1"/>
+            </p:cNvPicPr>
+            <p:nvPr/>
+          </p:nvPicPr>
+          <p:blipFill>
+            <a:blip r:embed="rId9" cstate="print">
+              <a:extLst>
+                <a:ext uri="{28A0092B-C50C-407E-A947-70E740481C1C}">
+                  <a14:useLocalDpi xmlns:a14="http://schemas.microsoft.com/office/drawing/2010/main" val="0"/>
+                </a:ext>
+              </a:extLst>
+            </a:blip>
+            <a:stretch>
+              <a:fillRect/>
+            </a:stretch>
+          </p:blipFill>
+          <p:spPr>
+            <a:xfrm>
+              <a:off x="1135472" y="8648158"/>
+              <a:ext cx="2050988" cy="229045"/>
+            </a:xfrm>
+            <a:prstGeom prst="rect">
+              <a:avLst/>
+            </a:prstGeom>
+          </p:spPr>
+        </p:pic>
+        <p:pic>
+          <p:nvPicPr>
+            <p:cNvPr id="37" name="Bild 9" descr="Screen Shot 2016-05-24 at 18.24.13.png"/>
+            <p:cNvPicPr>
+              <a:picLocks noChangeAspect="1"/>
+            </p:cNvPicPr>
+            <p:nvPr/>
+          </p:nvPicPr>
+          <p:blipFill>
+            <a:blip r:embed="rId10" cstate="print">
+              <a:extLst>
+                <a:ext uri="{28A0092B-C50C-407E-A947-70E740481C1C}">
+                  <a14:useLocalDpi xmlns:a14="http://schemas.microsoft.com/office/drawing/2010/main" val="0"/>
+                </a:ext>
+              </a:extLst>
+            </a:blip>
+            <a:stretch>
+              <a:fillRect/>
+            </a:stretch>
+          </p:blipFill>
+          <p:spPr>
+            <a:xfrm>
+              <a:off x="1686966" y="8561495"/>
+              <a:ext cx="109843" cy="144016"/>
+            </a:xfrm>
+            <a:prstGeom prst="rect">
+              <a:avLst/>
+            </a:prstGeom>
+          </p:spPr>
+        </p:pic>
+        <p:pic>
+          <p:nvPicPr>
+            <p:cNvPr id="38" name="Bild 28" descr="Screen Shot 2016-05-24 at 18.24.13.png"/>
+            <p:cNvPicPr>
+              <a:picLocks noChangeAspect="1"/>
+            </p:cNvPicPr>
+            <p:nvPr/>
+          </p:nvPicPr>
+          <p:blipFill>
+            <a:blip r:embed="rId10" cstate="print">
+              <a:extLst>
+                <a:ext uri="{28A0092B-C50C-407E-A947-70E740481C1C}">
+                  <a14:useLocalDpi xmlns:a14="http://schemas.microsoft.com/office/drawing/2010/main" val="0"/>
+                </a:ext>
+              </a:extLst>
+            </a:blip>
+            <a:stretch>
+              <a:fillRect/>
+            </a:stretch>
+          </p:blipFill>
+          <p:spPr>
+            <a:xfrm>
+              <a:off x="2865320" y="8521686"/>
+              <a:ext cx="109843" cy="144016"/>
+            </a:xfrm>
+            <a:prstGeom prst="rect">
+              <a:avLst/>
+            </a:prstGeom>
+          </p:spPr>
+        </p:pic>
+      </p:grpSp>
     </p:spTree>
     <p:extLst>
       <p:ext uri="{BB962C8B-B14F-4D97-AF65-F5344CB8AC3E}">

</xml_diff>

<commit_message>
linke seite fertig, mit fig nummern
</commit_message>
<xml_diff>
--- a/poster/poster.pptx
+++ b/poster/poster.pptx
@@ -48756,7 +48756,7 @@
             </a:r>
             <a:r>
               <a:rPr lang="en-GB" sz="1100" dirty="0" smtClean="0"/>
-              <a:t>Problem</a:t>
+              <a:t>Problem (Fig. 3)</a:t>
             </a:r>
           </a:p>
           <a:p>
@@ -48817,22 +48817,39 @@
             <a:endParaRPr lang="en-GB" sz="1100" dirty="0"/>
           </a:p>
           <a:p>
+            <a:pPr marL="171450" indent="-171450">
+              <a:buFont typeface="Arial" panose="020B0604020202020204" pitchFamily="34" charset="0"/>
+              <a:buChar char="•"/>
+            </a:pPr>
+            <a:r>
+              <a:rPr lang="en-GB" sz="1100" dirty="0" smtClean="0"/>
+              <a:t>Neural </a:t>
+            </a:r>
             <a:r>
               <a:rPr lang="en-GB" sz="1100" dirty="0"/>
-              <a:t>1.    Neural Network: Non-Linear Activation</a:t>
-            </a:r>
-          </a:p>
-          <a:p>
+              <a:t>Network: </a:t>
+            </a:r>
+            <a:r>
+              <a:rPr lang="en-GB" sz="1100" dirty="0" smtClean="0"/>
+              <a:t>Non-linear activation function </a:t>
+            </a:r>
             <a:r>
               <a:rPr lang="en-GB" sz="1100" dirty="0"/>
-              <a:t>       Function applied to Input to create</a:t>
-            </a:r>
-          </a:p>
-          <a:p>
+              <a:t>applied to </a:t>
+            </a:r>
+            <a:r>
+              <a:rPr lang="en-GB" sz="1100" dirty="0" smtClean="0"/>
+              <a:t>input </a:t>
+            </a:r>
             <a:r>
               <a:rPr lang="en-GB" sz="1100" dirty="0"/>
-              <a:t>       Non-Linear Output</a:t>
-            </a:r>
+              <a:t>to </a:t>
+            </a:r>
+            <a:r>
+              <a:rPr lang="en-GB" sz="1100" dirty="0" smtClean="0"/>
+              <a:t>create non-linear output (Fig. 4)</a:t>
+            </a:r>
+            <a:endParaRPr lang="en-GB" sz="1100" dirty="0"/>
           </a:p>
           <a:p>
             <a:pPr marL="228600" indent="-228600">
@@ -48865,33 +48882,40 @@
             <a:endParaRPr lang="en-GB" sz="1100" dirty="0" smtClean="0"/>
           </a:p>
           <a:p>
-            <a:endParaRPr lang="en-GB" sz="1100" dirty="0"/>
-          </a:p>
-          <a:p>
-            <a:pPr marL="228600" indent="-228600">
-              <a:buAutoNum type="arabicPeriod" startAt="2"/>
-            </a:pPr>
-            <a:r>
-              <a:rPr lang="en-GB" sz="1100" dirty="0"/>
-              <a:t>Deep Neural Network: Multiple Connected Layers of weights,</a:t>
-            </a:r>
-          </a:p>
-          <a:p>
-            <a:r>
-              <a:rPr lang="en-GB" sz="1100" dirty="0"/>
-              <a:t>       which are </a:t>
-            </a:r>
-            <a:r>
-              <a:rPr lang="en-GB" sz="1100" dirty="0" smtClean="0"/>
-              <a:t>trained</a:t>
-            </a:r>
+            <a:endParaRPr lang="en-GB" sz="1100" dirty="0" smtClean="0"/>
           </a:p>
           <a:p>
             <a:endParaRPr lang="en-GB" sz="1100" dirty="0"/>
           </a:p>
           <a:p>
-            <a:pPr marL="228600" indent="-228600">
-              <a:buAutoNum type="arabicPeriod" startAt="3"/>
+            <a:pPr marL="171450" indent="-171450">
+              <a:buFont typeface="Arial" panose="020B0604020202020204" pitchFamily="34" charset="0"/>
+              <a:buChar char="•"/>
+            </a:pPr>
+            <a:r>
+              <a:rPr lang="en-GB" sz="1100" dirty="0"/>
+              <a:t>Deep Neural Network: Multiple Connected Layers of </a:t>
+            </a:r>
+            <a:r>
+              <a:rPr lang="en-GB" sz="1100" dirty="0" smtClean="0"/>
+              <a:t>weights, which </a:t>
+            </a:r>
+            <a:r>
+              <a:rPr lang="en-GB" sz="1100" dirty="0"/>
+              <a:t>are </a:t>
+            </a:r>
+            <a:r>
+              <a:rPr lang="en-GB" sz="1100" dirty="0" smtClean="0"/>
+              <a:t>trained</a:t>
+            </a:r>
+          </a:p>
+          <a:p>
+            <a:endParaRPr lang="en-GB" sz="1100" dirty="0"/>
+          </a:p>
+          <a:p>
+            <a:pPr marL="171450" indent="-171450">
+              <a:buFont typeface="Arial" panose="020B0604020202020204" pitchFamily="34" charset="0"/>
+              <a:buChar char="•"/>
             </a:pPr>
             <a:r>
               <a:rPr lang="en-GB" sz="1100" dirty="0"/>
@@ -48903,8 +48927,17 @@
             </a:r>
             <a:r>
               <a:rPr lang="en-GB" sz="1100" dirty="0"/>
-              <a:t>a  stack of voxel or a activation map</a:t>
-            </a:r>
+              <a:t>a  stack of voxel or a activation </a:t>
+            </a:r>
+            <a:r>
+              <a:rPr lang="en-GB" sz="1100" dirty="0" smtClean="0"/>
+              <a:t>map (Fig. </a:t>
+            </a:r>
+            <a:r>
+              <a:rPr lang="en-GB" sz="1100" smtClean="0"/>
+              <a:t>5)</a:t>
+            </a:r>
+            <a:endParaRPr lang="en-GB" sz="1100" dirty="0"/>
           </a:p>
           <a:p>
             <a:endParaRPr lang="en-GB" sz="1100" i="1" dirty="0"/>
@@ -50351,6 +50384,28 @@
               </a:rPr>
               <a:t>/ </a:t>
             </a:r>
+            <a:endParaRPr lang="de-DE" sz="600" b="1" dirty="0" smtClean="0">
+              <a:latin typeface="Arial (Textkörper)"/>
+              <a:cs typeface="Arial (Textkörper)"/>
+            </a:endParaRPr>
+          </a:p>
+          <a:p>
+            <a:pPr>
+              <a:lnSpc>
+                <a:spcPct val="120000"/>
+              </a:lnSpc>
+            </a:pPr>
+            <a:r>
+              <a:rPr lang="de-DE" sz="600" b="1" dirty="0" smtClean="0">
+                <a:latin typeface="Arial (Textkörper)"/>
+                <a:cs typeface="Arial (Textkörper)"/>
+              </a:rPr>
+              <a:t>[4] Udacity Deep Learning course</a:t>
+            </a:r>
+            <a:endParaRPr lang="de-DE" sz="600" b="1" dirty="0" smtClean="0">
+              <a:latin typeface="Arial (Textkörper)"/>
+              <a:cs typeface="Arial (Textkörper)"/>
+            </a:endParaRPr>
           </a:p>
         </p:txBody>
       </p:sp>
@@ -51288,7 +51343,7 @@
         </p:blipFill>
         <p:spPr>
           <a:xfrm>
-            <a:off x="3585379" y="5039725"/>
+            <a:off x="3585379" y="4932970"/>
             <a:ext cx="1631064" cy="823749"/>
           </a:xfrm>
           <a:prstGeom prst="rect">
@@ -52368,8 +52423,8 @@
         </p:blipFill>
         <p:spPr>
           <a:xfrm>
-            <a:off x="1278249" y="7368536"/>
-            <a:ext cx="2412268" cy="1391606"/>
+            <a:off x="1278248" y="7368535"/>
+            <a:ext cx="2664295" cy="1536997"/>
           </a:xfrm>
           <a:prstGeom prst="rect">
             <a:avLst/>
@@ -52861,8 +52916,8 @@
         </p:nvGrpSpPr>
         <p:grpSpPr>
           <a:xfrm>
-            <a:off x="960831" y="9800442"/>
-            <a:ext cx="3276364" cy="715190"/>
+            <a:off x="1048852" y="9685498"/>
+            <a:ext cx="3721845" cy="812433"/>
             <a:chOff x="710850" y="8162013"/>
             <a:chExt cx="3276364" cy="715190"/>
           </a:xfrm>
@@ -52988,6 +53043,205 @@
           </p:spPr>
         </p:pic>
       </p:grpSp>
+      <p:sp>
+        <p:nvSpPr>
+          <p:cNvPr id="13" name="TextBox 12"/>
+          <p:cNvSpPr txBox="1"/>
+          <p:nvPr/>
+        </p:nvSpPr>
+        <p:spPr>
+          <a:xfrm>
+            <a:off x="3745998" y="5636274"/>
+            <a:ext cx="1384677" cy="216024"/>
+          </a:xfrm>
+          <a:prstGeom prst="rect">
+            <a:avLst/>
+          </a:prstGeom>
+          <a:noFill/>
+        </p:spPr>
+        <p:txBody>
+          <a:bodyPr wrap="square" lIns="0" tIns="0" rIns="0" bIns="0" rtlCol="0">
+            <a:noAutofit/>
+          </a:bodyPr>
+          <a:lstStyle/>
+          <a:p>
+            <a:r>
+              <a:rPr lang="de-CH" sz="850" dirty="0" smtClean="0">
+                <a:solidFill>
+                  <a:schemeClr val="accent1"/>
+                </a:solidFill>
+              </a:rPr>
+              <a:t>Fig. 2: voxelized models;</a:t>
+            </a:r>
+            <a:br>
+              <a:rPr lang="de-CH" sz="850" dirty="0" smtClean="0">
+                <a:solidFill>
+                  <a:schemeClr val="accent1"/>
+                </a:solidFill>
+              </a:rPr>
+            </a:br>
+            <a:r>
+              <a:rPr lang="de-CH" sz="850" dirty="0" smtClean="0">
+                <a:solidFill>
+                  <a:schemeClr val="accent1"/>
+                </a:solidFill>
+              </a:rPr>
+              <a:t>Source: Voxnet paper [1]</a:t>
+            </a:r>
+            <a:endParaRPr lang="de-CH" sz="850" dirty="0">
+              <a:solidFill>
+                <a:schemeClr val="accent1"/>
+              </a:solidFill>
+            </a:endParaRPr>
+          </a:p>
+        </p:txBody>
+      </p:sp>
+      <p:sp>
+        <p:nvSpPr>
+          <p:cNvPr id="41" name="TextBox 40"/>
+          <p:cNvSpPr txBox="1"/>
+          <p:nvPr/>
+        </p:nvSpPr>
+        <p:spPr>
+          <a:xfrm>
+            <a:off x="1350256" y="10621602"/>
+            <a:ext cx="2265206" cy="216024"/>
+          </a:xfrm>
+          <a:prstGeom prst="rect">
+            <a:avLst/>
+          </a:prstGeom>
+          <a:noFill/>
+        </p:spPr>
+        <p:txBody>
+          <a:bodyPr wrap="square" lIns="0" tIns="0" rIns="0" bIns="0" rtlCol="0">
+            <a:noAutofit/>
+          </a:bodyPr>
+          <a:lstStyle/>
+          <a:p>
+            <a:r>
+              <a:rPr lang="de-CH" sz="850" dirty="0" smtClean="0">
+                <a:solidFill>
+                  <a:schemeClr val="accent1"/>
+                </a:solidFill>
+              </a:rPr>
+              <a:t>Fig. 4: Relu; Source: Udacity [4]</a:t>
+            </a:r>
+            <a:endParaRPr lang="de-CH" sz="850" dirty="0">
+              <a:solidFill>
+                <a:schemeClr val="accent1"/>
+              </a:solidFill>
+            </a:endParaRPr>
+          </a:p>
+        </p:txBody>
+      </p:sp>
+      <p:sp>
+        <p:nvSpPr>
+          <p:cNvPr id="43" name="TextBox 42"/>
+          <p:cNvSpPr txBox="1"/>
+          <p:nvPr/>
+        </p:nvSpPr>
+        <p:spPr>
+          <a:xfrm>
+            <a:off x="1764540" y="8966748"/>
+            <a:ext cx="3363471" cy="216024"/>
+          </a:xfrm>
+          <a:prstGeom prst="rect">
+            <a:avLst/>
+          </a:prstGeom>
+          <a:noFill/>
+        </p:spPr>
+        <p:txBody>
+          <a:bodyPr wrap="square" lIns="0" tIns="0" rIns="0" bIns="0" rtlCol="0">
+            <a:noAutofit/>
+          </a:bodyPr>
+          <a:lstStyle/>
+          <a:p>
+            <a:r>
+              <a:rPr lang="de-CH" sz="850" dirty="0" smtClean="0">
+                <a:solidFill>
+                  <a:schemeClr val="accent1"/>
+                </a:solidFill>
+              </a:rPr>
+              <a:t>Fig. 3: </a:t>
+            </a:r>
+            <a:r>
+              <a:rPr lang="de-CH" sz="850" dirty="0">
+                <a:solidFill>
+                  <a:schemeClr val="accent1"/>
+                </a:solidFill>
+              </a:rPr>
+              <a:t>Classification </a:t>
+            </a:r>
+            <a:r>
+              <a:rPr lang="de-CH" sz="850" dirty="0" smtClean="0">
+                <a:solidFill>
+                  <a:schemeClr val="accent1"/>
+                </a:solidFill>
+              </a:rPr>
+              <a:t>problem; Source</a:t>
+            </a:r>
+            <a:r>
+              <a:rPr lang="de-CH" sz="850" dirty="0">
+                <a:solidFill>
+                  <a:schemeClr val="accent1"/>
+                </a:solidFill>
+              </a:rPr>
+              <a:t>: </a:t>
+            </a:r>
+            <a:r>
+              <a:rPr lang="de-CH" sz="850" dirty="0" smtClean="0">
+                <a:solidFill>
+                  <a:schemeClr val="accent1"/>
+                </a:solidFill>
+              </a:rPr>
+              <a:t>Udacity [4]</a:t>
+            </a:r>
+            <a:endParaRPr lang="de-CH" sz="850" dirty="0">
+              <a:solidFill>
+                <a:schemeClr val="accent1"/>
+              </a:solidFill>
+            </a:endParaRPr>
+          </a:p>
+        </p:txBody>
+      </p:sp>
+      <p:sp>
+        <p:nvSpPr>
+          <p:cNvPr id="45" name="TextBox 44"/>
+          <p:cNvSpPr txBox="1"/>
+          <p:nvPr/>
+        </p:nvSpPr>
+        <p:spPr>
+          <a:xfrm>
+            <a:off x="1048852" y="13404585"/>
+            <a:ext cx="2265206" cy="216024"/>
+          </a:xfrm>
+          <a:prstGeom prst="rect">
+            <a:avLst/>
+          </a:prstGeom>
+          <a:noFill/>
+        </p:spPr>
+        <p:txBody>
+          <a:bodyPr wrap="square" lIns="0" tIns="0" rIns="0" bIns="0" rtlCol="0">
+            <a:noAutofit/>
+          </a:bodyPr>
+          <a:lstStyle/>
+          <a:p>
+            <a:r>
+              <a:rPr lang="de-CH" sz="850" dirty="0" smtClean="0">
+                <a:solidFill>
+                  <a:schemeClr val="accent1"/>
+                </a:solidFill>
+              </a:rPr>
+              <a:t>Fig. 5: Convolution; Source: Udacity [4]</a:t>
+            </a:r>
+            <a:endParaRPr lang="de-CH" sz="850" dirty="0">
+              <a:solidFill>
+                <a:schemeClr val="accent1"/>
+              </a:solidFill>
+            </a:endParaRPr>
+          </a:p>
+        </p:txBody>
+      </p:sp>
     </p:spTree>
     <p:extLst>
       <p:ext uri="{BB962C8B-B14F-4D97-AF65-F5344CB8AC3E}">

</xml_diff>

<commit_message>
final poster upload with pdf
</commit_message>
<xml_diff>
--- a/poster/poster.pptx
+++ b/poster/poster.pptx
@@ -49064,7 +49064,7 @@
         </p:nvSpPr>
         <p:spPr>
           <a:xfrm>
-            <a:off x="5526720" y="8577746"/>
+            <a:off x="5549032" y="8577746"/>
             <a:ext cx="4716463" cy="4195366"/>
           </a:xfrm>
           <a:prstGeom prst="rect">
@@ -50813,6 +50813,15 @@
               <a:rPr lang="en-GB" sz="1100" dirty="0" smtClean="0"/>
               <a:t>parameters</a:t>
             </a:r>
+          </a:p>
+          <a:p>
+            <a:pPr marL="171450" indent="-171450">
+              <a:lnSpc>
+                <a:spcPct val="50000"/>
+              </a:lnSpc>
+              <a:buFont typeface="Arial" panose="020B0604020202020204" pitchFamily="34" charset="0"/>
+              <a:buChar char="•"/>
+            </a:pPr>
             <a:endParaRPr lang="en-GB" sz="1100" dirty="0"/>
           </a:p>
           <a:p>
@@ -50837,10 +50846,10 @@
             <a:endParaRPr lang="en-GB" sz="1100" b="1" dirty="0"/>
           </a:p>
           <a:p>
-            <a:endParaRPr lang="en-GB" sz="1100" b="1" dirty="0" smtClean="0"/>
+            <a:endParaRPr lang="en-GB" sz="1100" b="1" dirty="0"/>
           </a:p>
           <a:p>
-            <a:endParaRPr lang="en-GB" sz="1100" b="1" dirty="0"/>
+            <a:endParaRPr lang="en-GB" sz="1100" b="1" dirty="0" smtClean="0"/>
           </a:p>
           <a:p>
             <a:endParaRPr lang="en-GB" sz="1100" b="1" dirty="0" smtClean="0"/>

</xml_diff>